<commit_message>
added presentation notes from today's call
</commit_message>
<xml_diff>
--- a/Documents/Presentations/Feb-2020-update-to-DDI-CDS-wg.pptx
+++ b/Documents/Presentations/Feb-2020-update-to-DDI-CDS-wg.pptx
@@ -29,6 +29,7 @@
     <p:sldId id="271" r:id="rId24"/>
     <p:sldId id="272" r:id="rId25"/>
     <p:sldId id="273" r:id="rId26"/>
+    <p:sldId id="274" r:id="rId27"/>
   </p:sldIdLst>
   <p:sldSz cx="10080625" cy="5670550"/>
   <p:notesSz cx="7772400" cy="10058400"/>
@@ -95,7 +96,7 @@
         </p:spPr>
         <p:txBody>
           <a:bodyPr lIns="0" rIns="0" tIns="0" bIns="0" anchor="ctr">
-            <a:spAutoFit/>
+            <a:noAutofit/>
           </a:bodyPr>
           <a:p>
             <a:pPr algn="ctr"/>
@@ -208,7 +209,7 @@
         </p:spPr>
         <p:txBody>
           <a:bodyPr lIns="0" rIns="0" tIns="0" bIns="0" anchor="ctr">
-            <a:spAutoFit/>
+            <a:noAutofit/>
           </a:bodyPr>
           <a:p>
             <a:pPr algn="ctr"/>
@@ -381,7 +382,7 @@
         </p:spPr>
         <p:txBody>
           <a:bodyPr lIns="0" rIns="0" tIns="0" bIns="0" anchor="ctr">
-            <a:spAutoFit/>
+            <a:noAutofit/>
           </a:bodyPr>
           <a:p>
             <a:pPr algn="ctr"/>
@@ -636,7 +637,7 @@
         </p:spPr>
         <p:txBody>
           <a:bodyPr lIns="0" rIns="0" tIns="0" bIns="0" anchor="ctr">
-            <a:spAutoFit/>
+            <a:noAutofit/>
           </a:bodyPr>
           <a:p>
             <a:pPr algn="ctr"/>
@@ -667,7 +668,7 @@
         </p:spPr>
         <p:txBody>
           <a:bodyPr lIns="0" rIns="0" tIns="0" bIns="0" anchor="ctr">
-            <a:spAutoFit/>
+            <a:noAutofit/>
           </a:bodyPr>
           <a:p>
             <a:pPr algn="ctr"/>
@@ -720,7 +721,7 @@
         </p:spPr>
         <p:txBody>
           <a:bodyPr lIns="0" rIns="0" tIns="0" bIns="0" anchor="ctr">
-            <a:spAutoFit/>
+            <a:noAutofit/>
           </a:bodyPr>
           <a:p>
             <a:pPr algn="ctr"/>
@@ -803,7 +804,7 @@
         </p:spPr>
         <p:txBody>
           <a:bodyPr lIns="0" rIns="0" tIns="0" bIns="0" anchor="ctr">
-            <a:spAutoFit/>
+            <a:noAutofit/>
           </a:bodyPr>
           <a:p>
             <a:pPr algn="ctr"/>
@@ -916,7 +917,7 @@
         </p:spPr>
         <p:txBody>
           <a:bodyPr lIns="0" rIns="0" tIns="0" bIns="0" anchor="ctr">
-            <a:spAutoFit/>
+            <a:noAutofit/>
           </a:bodyPr>
           <a:p>
             <a:pPr algn="ctr"/>
@@ -969,7 +970,7 @@
         </p:spPr>
         <p:txBody>
           <a:bodyPr lIns="0" rIns="0" tIns="0" bIns="0" anchor="ctr">
-            <a:spAutoFit/>
+            <a:noAutofit/>
           </a:bodyPr>
           <a:p>
             <a:pPr algn="ctr"/>
@@ -1022,7 +1023,7 @@
         </p:spPr>
         <p:txBody>
           <a:bodyPr lIns="0" rIns="0" tIns="0" bIns="0" anchor="ctr">
-            <a:spAutoFit/>
+            <a:noAutofit/>
           </a:bodyPr>
           <a:p>
             <a:pPr algn="ctr"/>
@@ -1165,7 +1166,7 @@
         </p:spPr>
         <p:txBody>
           <a:bodyPr lIns="0" rIns="0" tIns="0" bIns="0" anchor="ctr">
-            <a:spAutoFit/>
+            <a:noAutofit/>
           </a:bodyPr>
           <a:p>
             <a:pPr algn="ctr"/>
@@ -1196,7 +1197,7 @@
         </p:spPr>
         <p:txBody>
           <a:bodyPr lIns="0" rIns="0" tIns="0" bIns="0" anchor="ctr">
-            <a:spAutoFit/>
+            <a:noAutofit/>
           </a:bodyPr>
           <a:p>
             <a:pPr algn="ctr"/>
@@ -1249,7 +1250,7 @@
         </p:spPr>
         <p:txBody>
           <a:bodyPr lIns="0" rIns="0" tIns="0" bIns="0" anchor="ctr">
-            <a:spAutoFit/>
+            <a:noAutofit/>
           </a:bodyPr>
           <a:p>
             <a:pPr algn="ctr"/>
@@ -1392,7 +1393,7 @@
         </p:spPr>
         <p:txBody>
           <a:bodyPr lIns="0" rIns="0" tIns="0" bIns="0" anchor="ctr">
-            <a:spAutoFit/>
+            <a:noAutofit/>
           </a:bodyPr>
           <a:p>
             <a:pPr algn="ctr"/>
@@ -1535,7 +1536,7 @@
         </p:spPr>
         <p:txBody>
           <a:bodyPr lIns="0" rIns="0" tIns="0" bIns="0" anchor="ctr">
-            <a:spAutoFit/>
+            <a:noAutofit/>
           </a:bodyPr>
           <a:p>
             <a:pPr algn="ctr"/>
@@ -1648,7 +1649,7 @@
         </p:spPr>
         <p:txBody>
           <a:bodyPr lIns="0" rIns="0" tIns="0" bIns="0" anchor="ctr">
-            <a:spAutoFit/>
+            <a:noAutofit/>
           </a:bodyPr>
           <a:p>
             <a:pPr algn="ctr"/>
@@ -1821,7 +1822,7 @@
         </p:spPr>
         <p:txBody>
           <a:bodyPr lIns="0" rIns="0" tIns="0" bIns="0" anchor="ctr">
-            <a:spAutoFit/>
+            <a:noAutofit/>
           </a:bodyPr>
           <a:p>
             <a:pPr algn="ctr"/>
@@ -2076,7 +2077,7 @@
         </p:spPr>
         <p:txBody>
           <a:bodyPr lIns="0" rIns="0" tIns="0" bIns="0" anchor="ctr">
-            <a:spAutoFit/>
+            <a:noAutofit/>
           </a:bodyPr>
           <a:p>
             <a:pPr algn="ctr"/>
@@ -2107,7 +2108,7 @@
         </p:spPr>
         <p:txBody>
           <a:bodyPr lIns="0" rIns="0" tIns="0" bIns="0" anchor="ctr">
-            <a:spAutoFit/>
+            <a:noAutofit/>
           </a:bodyPr>
           <a:p>
             <a:pPr algn="ctr"/>
@@ -2160,7 +2161,7 @@
         </p:spPr>
         <p:txBody>
           <a:bodyPr lIns="0" rIns="0" tIns="0" bIns="0" anchor="ctr">
-            <a:spAutoFit/>
+            <a:noAutofit/>
           </a:bodyPr>
           <a:p>
             <a:pPr algn="ctr"/>
@@ -2243,7 +2244,7 @@
         </p:spPr>
         <p:txBody>
           <a:bodyPr lIns="0" rIns="0" tIns="0" bIns="0" anchor="ctr">
-            <a:spAutoFit/>
+            <a:noAutofit/>
           </a:bodyPr>
           <a:p>
             <a:pPr algn="ctr"/>
@@ -2356,7 +2357,7 @@
         </p:spPr>
         <p:txBody>
           <a:bodyPr lIns="0" rIns="0" tIns="0" bIns="0" anchor="ctr">
-            <a:spAutoFit/>
+            <a:noAutofit/>
           </a:bodyPr>
           <a:p>
             <a:pPr algn="ctr"/>
@@ -2409,7 +2410,7 @@
         </p:spPr>
         <p:txBody>
           <a:bodyPr lIns="0" rIns="0" tIns="0" bIns="0" anchor="ctr">
-            <a:spAutoFit/>
+            <a:noAutofit/>
           </a:bodyPr>
           <a:p>
             <a:pPr algn="ctr"/>
@@ -2492,7 +2493,7 @@
         </p:spPr>
         <p:txBody>
           <a:bodyPr lIns="0" rIns="0" tIns="0" bIns="0" anchor="ctr">
-            <a:spAutoFit/>
+            <a:noAutofit/>
           </a:bodyPr>
           <a:p>
             <a:pPr algn="ctr"/>
@@ -2545,7 +2546,7 @@
         </p:spPr>
         <p:txBody>
           <a:bodyPr lIns="0" rIns="0" tIns="0" bIns="0" anchor="ctr">
-            <a:spAutoFit/>
+            <a:noAutofit/>
           </a:bodyPr>
           <a:p>
             <a:pPr algn="ctr"/>
@@ -2688,7 +2689,7 @@
         </p:spPr>
         <p:txBody>
           <a:bodyPr lIns="0" rIns="0" tIns="0" bIns="0" anchor="ctr">
-            <a:spAutoFit/>
+            <a:noAutofit/>
           </a:bodyPr>
           <a:p>
             <a:pPr algn="ctr"/>
@@ -2831,7 +2832,7 @@
         </p:spPr>
         <p:txBody>
           <a:bodyPr lIns="0" rIns="0" tIns="0" bIns="0" anchor="ctr">
-            <a:spAutoFit/>
+            <a:noAutofit/>
           </a:bodyPr>
           <a:p>
             <a:pPr algn="ctr"/>
@@ -2974,7 +2975,7 @@
         </p:spPr>
         <p:txBody>
           <a:bodyPr lIns="0" rIns="0" tIns="0" bIns="0" anchor="ctr">
-            <a:spAutoFit/>
+            <a:noAutofit/>
           </a:bodyPr>
           <a:p>
             <a:pPr algn="ctr"/>
@@ -3087,7 +3088,7 @@
         </p:spPr>
         <p:txBody>
           <a:bodyPr lIns="0" rIns="0" tIns="0" bIns="0" anchor="ctr">
-            <a:spAutoFit/>
+            <a:noAutofit/>
           </a:bodyPr>
           <a:p>
             <a:pPr algn="ctr"/>
@@ -3260,7 +3261,7 @@
         </p:spPr>
         <p:txBody>
           <a:bodyPr lIns="0" rIns="0" tIns="0" bIns="0" anchor="ctr">
-            <a:spAutoFit/>
+            <a:noAutofit/>
           </a:bodyPr>
           <a:p>
             <a:pPr algn="ctr"/>
@@ -3515,7 +3516,7 @@
         </p:spPr>
         <p:txBody>
           <a:bodyPr lIns="0" rIns="0" tIns="0" bIns="0" anchor="ctr">
-            <a:spAutoFit/>
+            <a:noAutofit/>
           </a:bodyPr>
           <a:p>
             <a:pPr algn="ctr"/>
@@ -3546,7 +3547,7 @@
         </p:spPr>
         <p:txBody>
           <a:bodyPr lIns="0" rIns="0" tIns="0" bIns="0" anchor="ctr">
-            <a:spAutoFit/>
+            <a:noAutofit/>
           </a:bodyPr>
           <a:p>
             <a:pPr algn="ctr"/>
@@ -3599,7 +3600,7 @@
         </p:spPr>
         <p:txBody>
           <a:bodyPr lIns="0" rIns="0" tIns="0" bIns="0" anchor="ctr">
-            <a:spAutoFit/>
+            <a:noAutofit/>
           </a:bodyPr>
           <a:p>
             <a:pPr algn="ctr"/>
@@ -3682,7 +3683,7 @@
         </p:spPr>
         <p:txBody>
           <a:bodyPr lIns="0" rIns="0" tIns="0" bIns="0" anchor="ctr">
-            <a:spAutoFit/>
+            <a:noAutofit/>
           </a:bodyPr>
           <a:p>
             <a:pPr algn="ctr"/>
@@ -3795,7 +3796,7 @@
         </p:spPr>
         <p:txBody>
           <a:bodyPr lIns="0" rIns="0" tIns="0" bIns="0" anchor="ctr">
-            <a:spAutoFit/>
+            <a:noAutofit/>
           </a:bodyPr>
           <a:p>
             <a:pPr algn="ctr"/>
@@ -3908,7 +3909,7 @@
         </p:spPr>
         <p:txBody>
           <a:bodyPr lIns="0" rIns="0" tIns="0" bIns="0" anchor="ctr">
-            <a:spAutoFit/>
+            <a:noAutofit/>
           </a:bodyPr>
           <a:p>
             <a:pPr algn="ctr"/>
@@ -3961,7 +3962,7 @@
         </p:spPr>
         <p:txBody>
           <a:bodyPr lIns="0" rIns="0" tIns="0" bIns="0" anchor="ctr">
-            <a:spAutoFit/>
+            <a:noAutofit/>
           </a:bodyPr>
           <a:p>
             <a:pPr algn="ctr"/>
@@ -4014,7 +4015,7 @@
         </p:spPr>
         <p:txBody>
           <a:bodyPr lIns="0" rIns="0" tIns="0" bIns="0" anchor="ctr">
-            <a:spAutoFit/>
+            <a:noAutofit/>
           </a:bodyPr>
           <a:p>
             <a:pPr algn="ctr"/>
@@ -4157,7 +4158,7 @@
         </p:spPr>
         <p:txBody>
           <a:bodyPr lIns="0" rIns="0" tIns="0" bIns="0" anchor="ctr">
-            <a:spAutoFit/>
+            <a:noAutofit/>
           </a:bodyPr>
           <a:p>
             <a:pPr algn="ctr"/>
@@ -4300,7 +4301,7 @@
         </p:spPr>
         <p:txBody>
           <a:bodyPr lIns="0" rIns="0" tIns="0" bIns="0" anchor="ctr">
-            <a:spAutoFit/>
+            <a:noAutofit/>
           </a:bodyPr>
           <a:p>
             <a:pPr algn="ctr"/>
@@ -4443,7 +4444,7 @@
         </p:spPr>
         <p:txBody>
           <a:bodyPr lIns="0" rIns="0" tIns="0" bIns="0" anchor="ctr">
-            <a:spAutoFit/>
+            <a:noAutofit/>
           </a:bodyPr>
           <a:p>
             <a:pPr algn="ctr"/>
@@ -4556,7 +4557,7 @@
         </p:spPr>
         <p:txBody>
           <a:bodyPr lIns="0" rIns="0" tIns="0" bIns="0" anchor="ctr">
-            <a:spAutoFit/>
+            <a:noAutofit/>
           </a:bodyPr>
           <a:p>
             <a:pPr algn="ctr"/>
@@ -4729,7 +4730,7 @@
         </p:spPr>
         <p:txBody>
           <a:bodyPr lIns="0" rIns="0" tIns="0" bIns="0" anchor="ctr">
-            <a:spAutoFit/>
+            <a:noAutofit/>
           </a:bodyPr>
           <a:p>
             <a:pPr algn="ctr"/>
@@ -4984,7 +4985,7 @@
         </p:spPr>
         <p:txBody>
           <a:bodyPr lIns="0" rIns="0" tIns="0" bIns="0" anchor="ctr">
-            <a:spAutoFit/>
+            <a:noAutofit/>
           </a:bodyPr>
           <a:p>
             <a:pPr algn="ctr"/>
@@ -5037,7 +5038,7 @@
         </p:spPr>
         <p:txBody>
           <a:bodyPr lIns="0" rIns="0" tIns="0" bIns="0" anchor="ctr">
-            <a:spAutoFit/>
+            <a:noAutofit/>
           </a:bodyPr>
           <a:p>
             <a:pPr algn="ctr"/>
@@ -5068,7 +5069,7 @@
         </p:spPr>
         <p:txBody>
           <a:bodyPr lIns="0" rIns="0" tIns="0" bIns="0" anchor="ctr">
-            <a:spAutoFit/>
+            <a:noAutofit/>
           </a:bodyPr>
           <a:p>
             <a:pPr algn="ctr"/>
@@ -5121,7 +5122,7 @@
         </p:spPr>
         <p:txBody>
           <a:bodyPr lIns="0" rIns="0" tIns="0" bIns="0" anchor="ctr">
-            <a:spAutoFit/>
+            <a:noAutofit/>
           </a:bodyPr>
           <a:p>
             <a:pPr algn="ctr"/>
@@ -5204,7 +5205,7 @@
         </p:spPr>
         <p:txBody>
           <a:bodyPr lIns="0" rIns="0" tIns="0" bIns="0" anchor="ctr">
-            <a:spAutoFit/>
+            <a:noAutofit/>
           </a:bodyPr>
           <a:p>
             <a:pPr algn="ctr"/>
@@ -5317,7 +5318,7 @@
         </p:spPr>
         <p:txBody>
           <a:bodyPr lIns="0" rIns="0" tIns="0" bIns="0" anchor="ctr">
-            <a:spAutoFit/>
+            <a:noAutofit/>
           </a:bodyPr>
           <a:p>
             <a:pPr algn="ctr"/>
@@ -5370,7 +5371,7 @@
         </p:spPr>
         <p:txBody>
           <a:bodyPr lIns="0" rIns="0" tIns="0" bIns="0" anchor="ctr">
-            <a:spAutoFit/>
+            <a:noAutofit/>
           </a:bodyPr>
           <a:p>
             <a:pPr algn="ctr"/>
@@ -5423,7 +5424,7 @@
         </p:spPr>
         <p:txBody>
           <a:bodyPr lIns="0" rIns="0" tIns="0" bIns="0" anchor="ctr">
-            <a:spAutoFit/>
+            <a:noAutofit/>
           </a:bodyPr>
           <a:p>
             <a:pPr algn="ctr"/>
@@ -5566,7 +5567,7 @@
         </p:spPr>
         <p:txBody>
           <a:bodyPr lIns="0" rIns="0" tIns="0" bIns="0" anchor="ctr">
-            <a:spAutoFit/>
+            <a:noAutofit/>
           </a:bodyPr>
           <a:p>
             <a:pPr algn="ctr"/>
@@ -5709,7 +5710,7 @@
         </p:spPr>
         <p:txBody>
           <a:bodyPr lIns="0" rIns="0" tIns="0" bIns="0" anchor="ctr">
-            <a:spAutoFit/>
+            <a:noAutofit/>
           </a:bodyPr>
           <a:p>
             <a:pPr algn="ctr"/>
@@ -5852,7 +5853,7 @@
         </p:spPr>
         <p:txBody>
           <a:bodyPr lIns="0" rIns="0" tIns="0" bIns="0" anchor="ctr">
-            <a:spAutoFit/>
+            <a:noAutofit/>
           </a:bodyPr>
           <a:p>
             <a:pPr algn="ctr"/>
@@ -5965,7 +5966,7 @@
         </p:spPr>
         <p:txBody>
           <a:bodyPr lIns="0" rIns="0" tIns="0" bIns="0" anchor="ctr">
-            <a:spAutoFit/>
+            <a:noAutofit/>
           </a:bodyPr>
           <a:p>
             <a:pPr algn="ctr"/>
@@ -6138,7 +6139,7 @@
         </p:spPr>
         <p:txBody>
           <a:bodyPr lIns="0" rIns="0" tIns="0" bIns="0" anchor="ctr">
-            <a:spAutoFit/>
+            <a:noAutofit/>
           </a:bodyPr>
           <a:p>
             <a:pPr algn="ctr"/>
@@ -6191,7 +6192,7 @@
         </p:spPr>
         <p:txBody>
           <a:bodyPr lIns="0" rIns="0" tIns="0" bIns="0" anchor="ctr">
-            <a:spAutoFit/>
+            <a:noAutofit/>
           </a:bodyPr>
           <a:p>
             <a:pPr algn="ctr"/>
@@ -6446,7 +6447,7 @@
         </p:spPr>
         <p:txBody>
           <a:bodyPr lIns="0" rIns="0" tIns="0" bIns="0" anchor="ctr">
-            <a:spAutoFit/>
+            <a:noAutofit/>
           </a:bodyPr>
           <a:p>
             <a:pPr algn="ctr"/>
@@ -6477,7 +6478,7 @@
         </p:spPr>
         <p:txBody>
           <a:bodyPr lIns="0" rIns="0" tIns="0" bIns="0" anchor="ctr">
-            <a:spAutoFit/>
+            <a:noAutofit/>
           </a:bodyPr>
           <a:p>
             <a:pPr algn="ctr"/>
@@ -6530,7 +6531,7 @@
         </p:spPr>
         <p:txBody>
           <a:bodyPr lIns="0" rIns="0" tIns="0" bIns="0" anchor="ctr">
-            <a:spAutoFit/>
+            <a:noAutofit/>
           </a:bodyPr>
           <a:p>
             <a:pPr algn="ctr"/>
@@ -6613,7 +6614,7 @@
         </p:spPr>
         <p:txBody>
           <a:bodyPr lIns="0" rIns="0" tIns="0" bIns="0" anchor="ctr">
-            <a:spAutoFit/>
+            <a:noAutofit/>
           </a:bodyPr>
           <a:p>
             <a:pPr algn="ctr"/>
@@ -6726,7 +6727,7 @@
         </p:spPr>
         <p:txBody>
           <a:bodyPr lIns="0" rIns="0" tIns="0" bIns="0" anchor="ctr">
-            <a:spAutoFit/>
+            <a:noAutofit/>
           </a:bodyPr>
           <a:p>
             <a:pPr algn="ctr"/>
@@ -6779,7 +6780,7 @@
         </p:spPr>
         <p:txBody>
           <a:bodyPr lIns="0" rIns="0" tIns="0" bIns="0" anchor="ctr">
-            <a:spAutoFit/>
+            <a:noAutofit/>
           </a:bodyPr>
           <a:p>
             <a:pPr algn="ctr"/>
@@ -6832,7 +6833,7 @@
         </p:spPr>
         <p:txBody>
           <a:bodyPr lIns="0" rIns="0" tIns="0" bIns="0" anchor="ctr">
-            <a:spAutoFit/>
+            <a:noAutofit/>
           </a:bodyPr>
           <a:p>
             <a:pPr algn="ctr"/>
@@ -6975,7 +6976,7 @@
         </p:spPr>
         <p:txBody>
           <a:bodyPr lIns="0" rIns="0" tIns="0" bIns="0" anchor="ctr">
-            <a:spAutoFit/>
+            <a:noAutofit/>
           </a:bodyPr>
           <a:p>
             <a:pPr algn="ctr"/>
@@ -7118,7 +7119,7 @@
         </p:spPr>
         <p:txBody>
           <a:bodyPr lIns="0" rIns="0" tIns="0" bIns="0" anchor="ctr">
-            <a:spAutoFit/>
+            <a:noAutofit/>
           </a:bodyPr>
           <a:p>
             <a:pPr algn="ctr"/>
@@ -7261,7 +7262,7 @@
         </p:spPr>
         <p:txBody>
           <a:bodyPr lIns="0" rIns="0" tIns="0" bIns="0" anchor="ctr">
-            <a:spAutoFit/>
+            <a:noAutofit/>
           </a:bodyPr>
           <a:p>
             <a:pPr algn="ctr"/>
@@ -7404,7 +7405,7 @@
         </p:spPr>
         <p:txBody>
           <a:bodyPr lIns="0" rIns="0" tIns="0" bIns="0" anchor="ctr">
-            <a:spAutoFit/>
+            <a:noAutofit/>
           </a:bodyPr>
           <a:p>
             <a:pPr algn="ctr"/>
@@ -7517,7 +7518,7 @@
         </p:spPr>
         <p:txBody>
           <a:bodyPr lIns="0" rIns="0" tIns="0" bIns="0" anchor="ctr">
-            <a:spAutoFit/>
+            <a:noAutofit/>
           </a:bodyPr>
           <a:p>
             <a:pPr algn="ctr"/>
@@ -7690,7 +7691,7 @@
         </p:spPr>
         <p:txBody>
           <a:bodyPr lIns="0" rIns="0" tIns="0" bIns="0" anchor="ctr">
-            <a:spAutoFit/>
+            <a:noAutofit/>
           </a:bodyPr>
           <a:p>
             <a:pPr algn="ctr"/>
@@ -7945,7 +7946,7 @@
         </p:spPr>
         <p:txBody>
           <a:bodyPr lIns="0" rIns="0" tIns="0" bIns="0" anchor="ctr">
-            <a:spAutoFit/>
+            <a:noAutofit/>
           </a:bodyPr>
           <a:p>
             <a:pPr algn="ctr"/>
@@ -7976,7 +7977,7 @@
         </p:spPr>
         <p:txBody>
           <a:bodyPr lIns="0" rIns="0" tIns="0" bIns="0" anchor="ctr">
-            <a:spAutoFit/>
+            <a:noAutofit/>
           </a:bodyPr>
           <a:p>
             <a:pPr algn="ctr"/>
@@ -8029,7 +8030,7 @@
         </p:spPr>
         <p:txBody>
           <a:bodyPr lIns="0" rIns="0" tIns="0" bIns="0" anchor="ctr">
-            <a:spAutoFit/>
+            <a:noAutofit/>
           </a:bodyPr>
           <a:p>
             <a:pPr algn="ctr"/>
@@ -8112,7 +8113,7 @@
         </p:spPr>
         <p:txBody>
           <a:bodyPr lIns="0" rIns="0" tIns="0" bIns="0" anchor="ctr">
-            <a:spAutoFit/>
+            <a:noAutofit/>
           </a:bodyPr>
           <a:p>
             <a:pPr algn="ctr"/>
@@ -8225,7 +8226,7 @@
         </p:spPr>
         <p:txBody>
           <a:bodyPr lIns="0" rIns="0" tIns="0" bIns="0" anchor="ctr">
-            <a:spAutoFit/>
+            <a:noAutofit/>
           </a:bodyPr>
           <a:p>
             <a:pPr algn="ctr"/>
@@ -8278,7 +8279,7 @@
         </p:spPr>
         <p:txBody>
           <a:bodyPr lIns="0" rIns="0" tIns="0" bIns="0" anchor="ctr">
-            <a:spAutoFit/>
+            <a:noAutofit/>
           </a:bodyPr>
           <a:p>
             <a:pPr algn="ctr"/>
@@ -8331,7 +8332,7 @@
         </p:spPr>
         <p:txBody>
           <a:bodyPr lIns="0" rIns="0" tIns="0" bIns="0" anchor="ctr">
-            <a:spAutoFit/>
+            <a:noAutofit/>
           </a:bodyPr>
           <a:p>
             <a:pPr algn="ctr"/>
@@ -8474,7 +8475,7 @@
         </p:spPr>
         <p:txBody>
           <a:bodyPr lIns="0" rIns="0" tIns="0" bIns="0" anchor="ctr">
-            <a:spAutoFit/>
+            <a:noAutofit/>
           </a:bodyPr>
           <a:p>
             <a:pPr algn="ctr"/>
@@ -8617,7 +8618,7 @@
         </p:spPr>
         <p:txBody>
           <a:bodyPr lIns="0" rIns="0" tIns="0" bIns="0" anchor="ctr">
-            <a:spAutoFit/>
+            <a:noAutofit/>
           </a:bodyPr>
           <a:p>
             <a:pPr algn="ctr"/>
@@ -8760,7 +8761,7 @@
         </p:spPr>
         <p:txBody>
           <a:bodyPr lIns="0" rIns="0" tIns="0" bIns="0" anchor="ctr">
-            <a:spAutoFit/>
+            <a:noAutofit/>
           </a:bodyPr>
           <a:p>
             <a:pPr algn="ctr"/>
@@ -8903,7 +8904,7 @@
         </p:spPr>
         <p:txBody>
           <a:bodyPr lIns="0" rIns="0" tIns="0" bIns="0" anchor="ctr">
-            <a:spAutoFit/>
+            <a:noAutofit/>
           </a:bodyPr>
           <a:p>
             <a:pPr algn="ctr"/>
@@ -9016,7 +9017,7 @@
         </p:spPr>
         <p:txBody>
           <a:bodyPr lIns="0" rIns="0" tIns="0" bIns="0" anchor="ctr">
-            <a:spAutoFit/>
+            <a:noAutofit/>
           </a:bodyPr>
           <a:p>
             <a:pPr algn="ctr"/>
@@ -9189,7 +9190,7 @@
         </p:spPr>
         <p:txBody>
           <a:bodyPr lIns="0" rIns="0" tIns="0" bIns="0" anchor="ctr">
-            <a:spAutoFit/>
+            <a:noAutofit/>
           </a:bodyPr>
           <a:p>
             <a:pPr algn="ctr"/>
@@ -9422,7 +9423,7 @@
         </p:spPr>
         <p:txBody>
           <a:bodyPr lIns="0" rIns="0" tIns="0" bIns="0" anchor="ctr">
-            <a:spAutoFit/>
+            <a:noAutofit/>
           </a:bodyPr>
           <a:p>
             <a:pPr algn="ctr"/>
@@ -9556,8 +9557,8 @@
         </p:nvSpPr>
         <p:spPr>
           <a:xfrm>
-            <a:off x="504000" y="225720"/>
-            <a:ext cx="9070920" cy="946800"/>
+            <a:off x="504000" y="226080"/>
+            <a:ext cx="9072000" cy="946440"/>
           </a:xfrm>
           <a:prstGeom prst="rect">
             <a:avLst/>
@@ -9565,16 +9566,17 @@
         </p:spPr>
         <p:txBody>
           <a:bodyPr lIns="0" rIns="0" tIns="0" bIns="0" anchor="ctr">
-            <a:spAutoFit/>
-          </a:bodyPr>
-          <a:p>
-            <a:r>
-              <a:rPr b="0" lang="en-US" sz="1800" spc="-1" strike="noStrike">
+            <a:noAutofit/>
+          </a:bodyPr>
+          <a:p>
+            <a:pPr algn="ctr"/>
+            <a:r>
+              <a:rPr b="0" lang="en-US" sz="4400" spc="-1" strike="noStrike">
                 <a:latin typeface="Arial"/>
               </a:rPr>
               <a:t>Click to edit the title text format</a:t>
             </a:r>
-            <a:endParaRPr b="0" lang="en-US" sz="1800" spc="-1" strike="noStrike">
+            <a:endParaRPr b="0" lang="en-US" sz="4400" spc="-1" strike="noStrike">
               <a:latin typeface="Arial"/>
             </a:endParaRPr>
           </a:p>
@@ -9593,15 +9595,15 @@
         <p:spPr>
           <a:xfrm>
             <a:off x="504000" y="1326600"/>
-            <a:ext cx="2919960" cy="1567440"/>
-          </a:xfrm>
-          <a:prstGeom prst="rect">
-            <a:avLst/>
-          </a:prstGeom>
-        </p:spPr>
-        <p:txBody>
-          <a:bodyPr lIns="0" rIns="0" tIns="0" bIns="0">
-            <a:normAutofit fontScale="4000"/>
+            <a:ext cx="9072000" cy="3288600"/>
+          </a:xfrm>
+          <a:prstGeom prst="rect">
+            <a:avLst/>
+          </a:prstGeom>
+        </p:spPr>
+        <p:txBody>
+          <a:bodyPr lIns="0" rIns="0" tIns="0" bIns="0">
+            <a:normAutofit/>
           </a:bodyPr>
           <a:p>
             <a:pPr marL="432000" indent="-324000">
@@ -9616,12 +9618,12 @@
               <a:buChar char=""/>
             </a:pPr>
             <a:r>
-              <a:rPr b="0" lang="en-US" sz="1800" spc="-1" strike="noStrike">
+              <a:rPr b="0" lang="en-US" sz="3200" spc="-1" strike="noStrike">
                 <a:latin typeface="Arial"/>
               </a:rPr>
               <a:t>Click to edit the outline text format</a:t>
             </a:r>
-            <a:endParaRPr b="0" lang="en-US" sz="1800" spc="-1" strike="noStrike">
+            <a:endParaRPr b="0" lang="en-US" sz="3200" spc="-1" strike="noStrike">
               <a:latin typeface="Arial"/>
             </a:endParaRPr>
           </a:p>
@@ -9638,12 +9640,12 @@
               <a:buChar char=""/>
             </a:pPr>
             <a:r>
-              <a:rPr b="0" lang="en-US" sz="1800" spc="-1" strike="noStrike">
+              <a:rPr b="0" lang="en-US" sz="2800" spc="-1" strike="noStrike">
                 <a:latin typeface="Arial"/>
               </a:rPr>
               <a:t>Second Outline Level</a:t>
             </a:r>
-            <a:endParaRPr b="0" lang="en-US" sz="1800" spc="-1" strike="noStrike">
+            <a:endParaRPr b="0" lang="en-US" sz="2800" spc="-1" strike="noStrike">
               <a:latin typeface="Arial"/>
             </a:endParaRPr>
           </a:p>
@@ -9660,12 +9662,12 @@
               <a:buChar char=""/>
             </a:pPr>
             <a:r>
-              <a:rPr b="0" lang="en-US" sz="1800" spc="-1" strike="noStrike">
+              <a:rPr b="0" lang="en-US" sz="2400" spc="-1" strike="noStrike">
                 <a:latin typeface="Arial"/>
               </a:rPr>
               <a:t>Third Outline Level</a:t>
             </a:r>
-            <a:endParaRPr b="0" lang="en-US" sz="1800" spc="-1" strike="noStrike">
+            <a:endParaRPr b="0" lang="en-US" sz="2400" spc="-1" strike="noStrike">
               <a:latin typeface="Arial"/>
             </a:endParaRPr>
           </a:p>
@@ -9682,12 +9684,12 @@
               <a:buChar char=""/>
             </a:pPr>
             <a:r>
-              <a:rPr b="0" lang="en-US" sz="1800" spc="-1" strike="noStrike">
+              <a:rPr b="0" lang="en-US" sz="2000" spc="-1" strike="noStrike">
                 <a:latin typeface="Arial"/>
               </a:rPr>
               <a:t>Fourth Outline Level</a:t>
             </a:r>
-            <a:endParaRPr b="0" lang="en-US" sz="1800" spc="-1" strike="noStrike">
+            <a:endParaRPr b="0" lang="en-US" sz="2000" spc="-1" strike="noStrike">
               <a:latin typeface="Arial"/>
             </a:endParaRPr>
           </a:p>
@@ -9704,12 +9706,12 @@
               <a:buChar char=""/>
             </a:pPr>
             <a:r>
-              <a:rPr b="0" lang="en-US" sz="1800" spc="-1" strike="noStrike">
+              <a:rPr b="0" lang="en-US" sz="2000" spc="-1" strike="noStrike">
                 <a:latin typeface="Arial"/>
               </a:rPr>
               <a:t>Fifth Outline Level</a:t>
             </a:r>
-            <a:endParaRPr b="0" lang="en-US" sz="1800" spc="-1" strike="noStrike">
+            <a:endParaRPr b="0" lang="en-US" sz="2000" spc="-1" strike="noStrike">
               <a:latin typeface="Arial"/>
             </a:endParaRPr>
           </a:p>
@@ -9726,12 +9728,12 @@
               <a:buChar char=""/>
             </a:pPr>
             <a:r>
-              <a:rPr b="0" lang="en-US" sz="1800" spc="-1" strike="noStrike">
+              <a:rPr b="0" lang="en-US" sz="2000" spc="-1" strike="noStrike">
                 <a:latin typeface="Arial"/>
               </a:rPr>
               <a:t>Sixth Outline Level</a:t>
             </a:r>
-            <a:endParaRPr b="0" lang="en-US" sz="1800" spc="-1" strike="noStrike">
+            <a:endParaRPr b="0" lang="en-US" sz="2000" spc="-1" strike="noStrike">
               <a:latin typeface="Arial"/>
             </a:endParaRPr>
           </a:p>
@@ -9748,12 +9750,12 @@
               <a:buChar char=""/>
             </a:pPr>
             <a:r>
-              <a:rPr b="0" lang="en-US" sz="1800" spc="-1" strike="noStrike">
+              <a:rPr b="0" lang="en-US" sz="2000" spc="-1" strike="noStrike">
                 <a:latin typeface="Arial"/>
               </a:rPr>
               <a:t>Seventh Outline Level</a:t>
             </a:r>
-            <a:endParaRPr b="0" lang="en-US" sz="1800" spc="-1" strike="noStrike">
+            <a:endParaRPr b="0" lang="en-US" sz="2000" spc="-1" strike="noStrike">
               <a:latin typeface="Arial"/>
             </a:endParaRPr>
           </a:p>
@@ -10315,7 +10317,7 @@
         <p:spPr>
           <a:xfrm>
             <a:off x="504000" y="225720"/>
-            <a:ext cx="9070920" cy="946800"/>
+            <a:ext cx="9071640" cy="946800"/>
           </a:xfrm>
           <a:prstGeom prst="rect">
             <a:avLst/>
@@ -10323,7 +10325,7 @@
         </p:spPr>
         <p:txBody>
           <a:bodyPr lIns="0" rIns="0" tIns="0" bIns="0" anchor="ctr">
-            <a:spAutoFit/>
+            <a:noAutofit/>
           </a:bodyPr>
           <a:p>
             <a:r>
@@ -10351,15 +10353,15 @@
         <p:spPr>
           <a:xfrm>
             <a:off x="504000" y="1326600"/>
-            <a:ext cx="1424520" cy="747360"/>
-          </a:xfrm>
-          <a:prstGeom prst="rect">
-            <a:avLst/>
-          </a:prstGeom>
-        </p:spPr>
-        <p:txBody>
-          <a:bodyPr lIns="0" rIns="0" tIns="0" bIns="0">
-            <a:normAutofit/>
+            <a:ext cx="4426560" cy="1568160"/>
+          </a:xfrm>
+          <a:prstGeom prst="rect">
+            <a:avLst/>
+          </a:prstGeom>
+        </p:spPr>
+        <p:txBody>
+          <a:bodyPr lIns="0" rIns="0" tIns="0" bIns="0">
+            <a:normAutofit fontScale="42000"/>
           </a:bodyPr>
           <a:p>
             <a:pPr marL="432000" indent="-324000">
@@ -10529,16 +10531,16 @@
         </p:nvSpPr>
         <p:spPr>
           <a:xfrm>
-            <a:off x="2000520" y="1326600"/>
-            <a:ext cx="1424520" cy="747360"/>
-          </a:xfrm>
-          <a:prstGeom prst="rect">
-            <a:avLst/>
-          </a:prstGeom>
-        </p:spPr>
-        <p:txBody>
-          <a:bodyPr lIns="0" rIns="0" tIns="0" bIns="0">
-            <a:normAutofit/>
+            <a:off x="5152680" y="1326600"/>
+            <a:ext cx="4426560" cy="1568160"/>
+          </a:xfrm>
+          <a:prstGeom prst="rect">
+            <a:avLst/>
+          </a:prstGeom>
+        </p:spPr>
+        <p:txBody>
+          <a:bodyPr lIns="0" rIns="0" tIns="0" bIns="0">
+            <a:normAutofit fontScale="42000"/>
           </a:bodyPr>
           <a:p>
             <a:pPr marL="432000" indent="-324000">
@@ -10708,16 +10710,16 @@
         </p:nvSpPr>
         <p:spPr>
           <a:xfrm>
-            <a:off x="504000" y="2145600"/>
-            <a:ext cx="2919960" cy="747360"/>
-          </a:xfrm>
-          <a:prstGeom prst="rect">
-            <a:avLst/>
-          </a:prstGeom>
-        </p:spPr>
-        <p:txBody>
-          <a:bodyPr lIns="0" rIns="0" tIns="0" bIns="0">
-            <a:normAutofit fontScale="1000"/>
+            <a:off x="504000" y="3044520"/>
+            <a:ext cx="9071640" cy="1568160"/>
+          </a:xfrm>
+          <a:prstGeom prst="rect">
+            <a:avLst/>
+          </a:prstGeom>
+        </p:spPr>
+        <p:txBody>
+          <a:bodyPr lIns="0" rIns="0" tIns="0" bIns="0">
+            <a:normAutofit fontScale="56000"/>
           </a:bodyPr>
           <a:p>
             <a:pPr marL="432000" indent="-324000">
@@ -10925,7 +10927,7 @@
         <p:spPr>
           <a:xfrm>
             <a:off x="504000" y="225720"/>
-            <a:ext cx="9070920" cy="946800"/>
+            <a:ext cx="9071640" cy="946800"/>
           </a:xfrm>
           <a:prstGeom prst="rect">
             <a:avLst/>
@@ -10933,7 +10935,7 @@
         </p:spPr>
         <p:txBody>
           <a:bodyPr lIns="0" rIns="0" tIns="0" bIns="0" anchor="ctr">
-            <a:spAutoFit/>
+            <a:noAutofit/>
           </a:bodyPr>
           <a:p>
             <a:r>
@@ -10961,15 +10963,15 @@
         <p:spPr>
           <a:xfrm>
             <a:off x="504000" y="1326600"/>
-            <a:ext cx="2919960" cy="747360"/>
-          </a:xfrm>
-          <a:prstGeom prst="rect">
-            <a:avLst/>
-          </a:prstGeom>
-        </p:spPr>
-        <p:txBody>
-          <a:bodyPr lIns="0" rIns="0" tIns="0" bIns="0">
-            <a:normAutofit fontScale="1000"/>
+            <a:ext cx="9071640" cy="1568160"/>
+          </a:xfrm>
+          <a:prstGeom prst="rect">
+            <a:avLst/>
+          </a:prstGeom>
+        </p:spPr>
+        <p:txBody>
+          <a:bodyPr lIns="0" rIns="0" tIns="0" bIns="0">
+            <a:normAutofit fontScale="56000"/>
           </a:bodyPr>
           <a:p>
             <a:pPr marL="432000" indent="-324000">
@@ -11139,16 +11141,16 @@
         </p:nvSpPr>
         <p:spPr>
           <a:xfrm>
-            <a:off x="504000" y="2145600"/>
-            <a:ext cx="2919960" cy="747360"/>
-          </a:xfrm>
-          <a:prstGeom prst="rect">
-            <a:avLst/>
-          </a:prstGeom>
-        </p:spPr>
-        <p:txBody>
-          <a:bodyPr lIns="0" rIns="0" tIns="0" bIns="0">
-            <a:normAutofit fontScale="1000"/>
+            <a:off x="504000" y="3044520"/>
+            <a:ext cx="9071640" cy="1568160"/>
+          </a:xfrm>
+          <a:prstGeom prst="rect">
+            <a:avLst/>
+          </a:prstGeom>
+        </p:spPr>
+        <p:txBody>
+          <a:bodyPr lIns="0" rIns="0" tIns="0" bIns="0">
+            <a:normAutofit fontScale="56000"/>
           </a:bodyPr>
           <a:p>
             <a:pPr marL="432000" indent="-324000">
@@ -11356,7 +11358,7 @@
         <p:spPr>
           <a:xfrm>
             <a:off x="504000" y="225720"/>
-            <a:ext cx="9070920" cy="946800"/>
+            <a:ext cx="9071640" cy="946800"/>
           </a:xfrm>
           <a:prstGeom prst="rect">
             <a:avLst/>
@@ -11364,7 +11366,7 @@
         </p:spPr>
         <p:txBody>
           <a:bodyPr lIns="0" rIns="0" tIns="0" bIns="0" anchor="ctr">
-            <a:spAutoFit/>
+            <a:noAutofit/>
           </a:bodyPr>
           <a:p>
             <a:r>
@@ -11392,15 +11394,15 @@
         <p:spPr>
           <a:xfrm>
             <a:off x="504000" y="1326600"/>
-            <a:ext cx="1424520" cy="747360"/>
-          </a:xfrm>
-          <a:prstGeom prst="rect">
-            <a:avLst/>
-          </a:prstGeom>
-        </p:spPr>
-        <p:txBody>
-          <a:bodyPr lIns="0" rIns="0" tIns="0" bIns="0">
-            <a:normAutofit/>
+            <a:ext cx="4426560" cy="1568160"/>
+          </a:xfrm>
+          <a:prstGeom prst="rect">
+            <a:avLst/>
+          </a:prstGeom>
+        </p:spPr>
+        <p:txBody>
+          <a:bodyPr lIns="0" rIns="0" tIns="0" bIns="0">
+            <a:normAutofit fontScale="42000"/>
           </a:bodyPr>
           <a:p>
             <a:pPr marL="432000" indent="-324000">
@@ -11570,16 +11572,16 @@
         </p:nvSpPr>
         <p:spPr>
           <a:xfrm>
-            <a:off x="2000520" y="1326600"/>
-            <a:ext cx="1424520" cy="747360"/>
-          </a:xfrm>
-          <a:prstGeom prst="rect">
-            <a:avLst/>
-          </a:prstGeom>
-        </p:spPr>
-        <p:txBody>
-          <a:bodyPr lIns="0" rIns="0" tIns="0" bIns="0">
-            <a:normAutofit/>
+            <a:off x="5152680" y="1326600"/>
+            <a:ext cx="4426560" cy="1568160"/>
+          </a:xfrm>
+          <a:prstGeom prst="rect">
+            <a:avLst/>
+          </a:prstGeom>
+        </p:spPr>
+        <p:txBody>
+          <a:bodyPr lIns="0" rIns="0" tIns="0" bIns="0">
+            <a:normAutofit fontScale="42000"/>
           </a:bodyPr>
           <a:p>
             <a:pPr marL="432000" indent="-324000">
@@ -11749,16 +11751,16 @@
         </p:nvSpPr>
         <p:spPr>
           <a:xfrm>
-            <a:off x="504000" y="2145600"/>
-            <a:ext cx="1424520" cy="747360"/>
-          </a:xfrm>
-          <a:prstGeom prst="rect">
-            <a:avLst/>
-          </a:prstGeom>
-        </p:spPr>
-        <p:txBody>
-          <a:bodyPr lIns="0" rIns="0" tIns="0" bIns="0">
-            <a:normAutofit/>
+            <a:off x="504000" y="3044520"/>
+            <a:ext cx="4426560" cy="1568160"/>
+          </a:xfrm>
+          <a:prstGeom prst="rect">
+            <a:avLst/>
+          </a:prstGeom>
+        </p:spPr>
+        <p:txBody>
+          <a:bodyPr lIns="0" rIns="0" tIns="0" bIns="0">
+            <a:normAutofit fontScale="42000"/>
           </a:bodyPr>
           <a:p>
             <a:pPr marL="432000" indent="-324000">
@@ -11928,16 +11930,16 @@
         </p:nvSpPr>
         <p:spPr>
           <a:xfrm>
-            <a:off x="2000520" y="2145600"/>
-            <a:ext cx="1424520" cy="747360"/>
-          </a:xfrm>
-          <a:prstGeom prst="rect">
-            <a:avLst/>
-          </a:prstGeom>
-        </p:spPr>
-        <p:txBody>
-          <a:bodyPr lIns="0" rIns="0" tIns="0" bIns="0">
-            <a:normAutofit/>
+            <a:off x="5152680" y="3044520"/>
+            <a:ext cx="4426560" cy="1568160"/>
+          </a:xfrm>
+          <a:prstGeom prst="rect">
+            <a:avLst/>
+          </a:prstGeom>
+        </p:spPr>
+        <p:txBody>
+          <a:bodyPr lIns="0" rIns="0" tIns="0" bIns="0">
+            <a:normAutofit fontScale="42000"/>
           </a:bodyPr>
           <a:p>
             <a:pPr marL="432000" indent="-324000">
@@ -12394,7 +12396,7 @@
         <p:spPr>
           <a:xfrm>
             <a:off x="504000" y="363600"/>
-            <a:ext cx="9070920" cy="670680"/>
+            <a:ext cx="9070560" cy="670320"/>
           </a:xfrm>
           <a:prstGeom prst="rect">
             <a:avLst/>
@@ -12445,7 +12447,7 @@
         <p:spPr>
           <a:xfrm>
             <a:off x="504000" y="2482560"/>
-            <a:ext cx="9070920" cy="975240"/>
+            <a:ext cx="9070560" cy="974880"/>
           </a:xfrm>
           <a:prstGeom prst="rect">
             <a:avLst/>
@@ -12546,7 +12548,7 @@
         <p:spPr>
           <a:xfrm>
             <a:off x="504000" y="363240"/>
-            <a:ext cx="9070920" cy="671040"/>
+            <a:ext cx="9070560" cy="670680"/>
           </a:xfrm>
           <a:prstGeom prst="rect">
             <a:avLst/>
@@ -12574,7 +12576,11 @@
             </a:pPr>
             <a:r>
               <a:rPr b="0" lang="en-US" sz="4400" spc="-1" strike="noStrike">
-                <a:latin typeface="Arial"/>
+                <a:solidFill>
+                  <a:srgbClr val="000000"/>
+                </a:solidFill>
+                <a:latin typeface="Arial"/>
+                <a:ea typeface="DejaVu Sans"/>
               </a:rPr>
               <a:t>Demonstration</a:t>
             </a:r>
@@ -12593,7 +12599,7 @@
         <p:spPr>
           <a:xfrm>
             <a:off x="1718640" y="1737360"/>
-            <a:ext cx="6102720" cy="2558520"/>
+            <a:ext cx="6102360" cy="2558520"/>
           </a:xfrm>
           <a:prstGeom prst="rect">
             <a:avLst/>
@@ -12621,7 +12627,11 @@
             </a:pPr>
             <a:r>
               <a:rPr b="0" lang="en-US" sz="1800" spc="-1" strike="noStrike">
-                <a:latin typeface="Arial"/>
+                <a:solidFill>
+                  <a:srgbClr val="000000"/>
+                </a:solidFill>
+                <a:latin typeface="Arial"/>
+                <a:ea typeface="DejaVu Sans"/>
               </a:rPr>
               <a:t>1. GET services</a:t>
             </a:r>
@@ -12647,7 +12657,11 @@
             </a:pPr>
             <a:r>
               <a:rPr b="0" lang="en-US" sz="1800" spc="-1" strike="noStrike">
-                <a:latin typeface="Arial"/>
+                <a:solidFill>
+                  <a:srgbClr val="000000"/>
+                </a:solidFill>
+                <a:latin typeface="Arial"/>
+                <a:ea typeface="DejaVu Sans"/>
               </a:rPr>
               <a:t>2. order-select with alert-non-serious true/false</a:t>
             </a:r>
@@ -12673,7 +12687,11 @@
             </a:pPr>
             <a:r>
               <a:rPr b="0" lang="en-US" sz="1800" spc="-1" strike="noStrike">
-                <a:latin typeface="Arial"/>
+                <a:solidFill>
+                  <a:srgbClr val="000000"/>
+                </a:solidFill>
+                <a:latin typeface="Arial"/>
+                <a:ea typeface="DejaVu Sans"/>
               </a:rPr>
               <a:t>3. order-select with show-evidence-support true/false</a:t>
             </a:r>
@@ -12699,7 +12717,11 @@
             </a:pPr>
             <a:r>
               <a:rPr b="0" lang="en-US" sz="1800" spc="-1" strike="noStrike">
-                <a:latin typeface="Arial"/>
+                <a:solidFill>
+                  <a:srgbClr val="000000"/>
+                </a:solidFill>
+                <a:latin typeface="Arial"/>
+                <a:ea typeface="DejaVu Sans"/>
               </a:rPr>
               <a:t>4. order-select with cache-for-order-sign-filtering true/false </a:t>
             </a:r>
@@ -12768,7 +12790,7 @@
         <p:spPr>
           <a:xfrm>
             <a:off x="529920" y="242280"/>
-            <a:ext cx="9070920" cy="396720"/>
+            <a:ext cx="9070560" cy="396360"/>
           </a:xfrm>
           <a:prstGeom prst="rect">
             <a:avLst/>
@@ -12796,7 +12818,11 @@
             </a:pPr>
             <a:r>
               <a:rPr b="0" lang="en-US" sz="2600" spc="-1" strike="noStrike">
-                <a:latin typeface="Arial"/>
+                <a:solidFill>
+                  <a:srgbClr val="000000"/>
+                </a:solidFill>
+                <a:latin typeface="Arial"/>
+                <a:ea typeface="DejaVu Sans"/>
               </a:rPr>
               <a:t>New Requirements to Support Configuration</a:t>
             </a:r>
@@ -12815,7 +12841,7 @@
         <p:spPr>
           <a:xfrm>
             <a:off x="360360" y="953280"/>
-            <a:ext cx="9662760" cy="3930120"/>
+            <a:ext cx="9662400" cy="3930120"/>
           </a:xfrm>
           <a:prstGeom prst="rect">
             <a:avLst/>
@@ -12843,7 +12869,11 @@
             </a:pPr>
             <a:r>
               <a:rPr b="0" lang="en-US" sz="1800" spc="-1" strike="noStrike">
-                <a:latin typeface="Arial"/>
+                <a:solidFill>
+                  <a:srgbClr val="000000"/>
+                </a:solidFill>
+                <a:latin typeface="Arial"/>
+                <a:ea typeface="DejaVu Sans"/>
               </a:rPr>
               <a:t>If the CDS service supports configuration:</a:t>
             </a:r>
@@ -12869,6 +12899,9 @@
             </a:pPr>
             <a:r>
               <a:rPr b="0" lang="en-US" sz="1800" spc="-1" strike="noStrike">
+                <a:solidFill>
+                  <a:srgbClr val="000000"/>
+                </a:solidFill>
                 <a:latin typeface="Arial"/>
                 <a:ea typeface="Noto Sans CJK SC"/>
               </a:rPr>
@@ -12886,6 +12919,9 @@
             </a:pPr>
             <a:r>
               <a:rPr b="0" lang="en-US" sz="1800" spc="-1" strike="noStrike">
+                <a:solidFill>
+                  <a:srgbClr val="000000"/>
+                </a:solidFill>
                 <a:latin typeface="Arial"/>
                 <a:ea typeface="Noto Sans CJK SC"/>
               </a:rPr>
@@ -12913,6 +12949,9 @@
             </a:pPr>
             <a:r>
               <a:rPr b="0" lang="en-US" sz="1800" spc="-1" strike="noStrike">
+                <a:solidFill>
+                  <a:srgbClr val="000000"/>
+                </a:solidFill>
                 <a:latin typeface="Arial"/>
                 <a:ea typeface="Noto Sans CJK SC"/>
               </a:rPr>
@@ -12930,6 +12969,9 @@
             </a:pPr>
             <a:r>
               <a:rPr b="0" lang="en-US" sz="1800" spc="-1" strike="noStrike">
+                <a:solidFill>
+                  <a:srgbClr val="000000"/>
+                </a:solidFill>
                 <a:latin typeface="Arial"/>
                 <a:ea typeface="Noto Sans CJK SC"/>
               </a:rPr>
@@ -12937,6 +12979,9 @@
             </a:r>
             <a:r>
               <a:rPr b="0" lang="en-US" sz="1800" spc="-1" strike="noStrike">
+                <a:solidFill>
+                  <a:srgbClr val="000000"/>
+                </a:solidFill>
                 <a:latin typeface="Arial"/>
                 <a:ea typeface="Noto Sans CJK SC"/>
               </a:rPr>
@@ -12964,6 +13009,9 @@
             </a:pPr>
             <a:r>
               <a:rPr b="0" lang="en-US" sz="1800" spc="-1" strike="noStrike">
+                <a:solidFill>
+                  <a:srgbClr val="000000"/>
+                </a:solidFill>
                 <a:latin typeface="Arial"/>
                 <a:ea typeface="Noto Sans CJK SC"/>
               </a:rPr>
@@ -12981,6 +13029,9 @@
             </a:pPr>
             <a:r>
               <a:rPr b="0" lang="en-US" sz="1800" spc="-1" strike="noStrike">
+                <a:solidFill>
+                  <a:srgbClr val="000000"/>
+                </a:solidFill>
                 <a:latin typeface="Arial"/>
                 <a:ea typeface="Noto Sans CJK SC"/>
               </a:rPr>
@@ -13028,6 +13079,9 @@
             </a:pPr>
             <a:r>
               <a:rPr b="0" lang="en-US" sz="1800" spc="-1" strike="noStrike">
+                <a:solidFill>
+                  <a:srgbClr val="000000"/>
+                </a:solidFill>
                 <a:latin typeface="Arial"/>
                 <a:ea typeface="Noto Sans CJK SC"/>
               </a:rPr>
@@ -13078,7 +13132,7 @@
         <p:spPr>
           <a:xfrm>
             <a:off x="529920" y="242280"/>
-            <a:ext cx="9070920" cy="396720"/>
+            <a:ext cx="9070560" cy="396360"/>
           </a:xfrm>
           <a:prstGeom prst="rect">
             <a:avLst/>
@@ -13106,7 +13160,11 @@
             </a:pPr>
             <a:r>
               <a:rPr b="0" lang="en-US" sz="2600" spc="-1" strike="noStrike">
-                <a:latin typeface="Arial"/>
+                <a:solidFill>
+                  <a:srgbClr val="000000"/>
+                </a:solidFill>
+                <a:latin typeface="Arial"/>
+                <a:ea typeface="DejaVu Sans"/>
               </a:rPr>
               <a:t>New Requirements to Support Configuration Cont...</a:t>
             </a:r>
@@ -13125,7 +13183,7 @@
         <p:spPr>
           <a:xfrm>
             <a:off x="268920" y="752760"/>
-            <a:ext cx="8861040" cy="5027400"/>
+            <a:ext cx="8860680" cy="5027400"/>
           </a:xfrm>
           <a:prstGeom prst="rect">
             <a:avLst/>
@@ -13153,7 +13211,11 @@
             </a:pPr>
             <a:r>
               <a:rPr b="0" lang="en-US" sz="1800" spc="-1" strike="noStrike">
-                <a:latin typeface="Arial"/>
+                <a:solidFill>
+                  <a:srgbClr val="000000"/>
+                </a:solidFill>
+                <a:latin typeface="Arial"/>
+                <a:ea typeface="DejaVu Sans"/>
               </a:rPr>
               <a:t>If the CDS service supports filtering alerts (the ‘filter-out-repeated-alerts’ config option)</a:t>
             </a:r>
@@ -13169,7 +13231,11 @@
             </a:pPr>
             <a:r>
               <a:rPr b="0" lang="en-US" sz="1800" spc="-1" strike="noStrike">
-                <a:latin typeface="Arial"/>
+                <a:solidFill>
+                  <a:srgbClr val="000000"/>
+                </a:solidFill>
+                <a:latin typeface="Arial"/>
+                <a:ea typeface="DejaVu Sans"/>
               </a:rPr>
               <a:t>1. The PlanDefinition for the service requires 1 and only 1 ‘relatedArtifact’ of </a:t>
             </a:r>
@@ -13185,7 +13251,11 @@
             </a:pPr>
             <a:r>
               <a:rPr b="0" lang="en-US" sz="1800" spc="-1" strike="noStrike">
-                <a:latin typeface="Arial"/>
+                <a:solidFill>
+                  <a:srgbClr val="000000"/>
+                </a:solidFill>
+                <a:latin typeface="Arial"/>
+                <a:ea typeface="DejaVu Sans"/>
               </a:rPr>
               <a:t>type ‘Documentation’ and this must include a unique and persistent URL to a </a:t>
             </a:r>
@@ -13201,7 +13271,11 @@
             </a:pPr>
             <a:r>
               <a:rPr b="0" lang="en-US" sz="1800" spc="-1" strike="noStrike">
-                <a:latin typeface="Arial"/>
+                <a:solidFill>
+                  <a:srgbClr val="000000"/>
+                </a:solidFill>
+                <a:latin typeface="Arial"/>
+                <a:ea typeface="DejaVu Sans"/>
               </a:rPr>
               <a:t>description of the knowledge artifact implemented by the PlanDefinition</a:t>
             </a:r>
@@ -13227,7 +13301,11 @@
             </a:pPr>
             <a:r>
               <a:rPr b="0" lang="en-US" sz="1800" spc="-1" strike="noStrike">
-                <a:latin typeface="Arial"/>
+                <a:solidFill>
+                  <a:srgbClr val="000000"/>
+                </a:solidFill>
+                <a:latin typeface="Arial"/>
+                <a:ea typeface="DejaVu Sans"/>
               </a:rPr>
               <a:t>2. The service must have mechanism to cache information from order-select requests</a:t>
             </a:r>
@@ -13243,7 +13321,11 @@
             </a:pPr>
             <a:r>
               <a:rPr b="0" lang="en-US" sz="1800" spc="-1" strike="noStrike">
-                <a:latin typeface="Arial"/>
+                <a:solidFill>
+                  <a:srgbClr val="000000"/>
+                </a:solidFill>
+                <a:latin typeface="Arial"/>
+                <a:ea typeface="DejaVu Sans"/>
               </a:rPr>
               <a:t>for use by the service when processing order-sign requests</a:t>
             </a:r>
@@ -13259,13 +13341,21 @@
             </a:pPr>
             <a:r>
               <a:rPr b="0" lang="en-US" sz="1800" spc="-1" strike="noStrike">
-                <a:latin typeface="Arial"/>
+                <a:solidFill>
+                  <a:srgbClr val="000000"/>
+                </a:solidFill>
+                <a:latin typeface="Arial"/>
+                <a:ea typeface="DejaVu Sans"/>
               </a:rPr>
               <a:t>	</a:t>
             </a:r>
             <a:r>
               <a:rPr b="0" lang="en-US" sz="1800" spc="-1" strike="noStrike">
-                <a:latin typeface="Arial"/>
+                <a:solidFill>
+                  <a:srgbClr val="000000"/>
+                </a:solidFill>
+                <a:latin typeface="Arial"/>
+                <a:ea typeface="DejaVu Sans"/>
               </a:rPr>
               <a:t>- Currently testing cache of: </a:t>
             </a:r>
@@ -13281,13 +13371,21 @@
             </a:pPr>
             <a:r>
               <a:rPr b="0" lang="en-US" sz="1800" spc="-1" strike="noStrike">
-                <a:latin typeface="Arial"/>
+                <a:solidFill>
+                  <a:srgbClr val="000000"/>
+                </a:solidFill>
+                <a:latin typeface="Arial"/>
+                <a:ea typeface="DejaVu Sans"/>
               </a:rPr>
               <a:t>            </a:t>
             </a:r>
             <a:r>
               <a:rPr b="0" lang="en-US" sz="1800" spc="-1" strike="noStrike">
-                <a:latin typeface="Arial"/>
+                <a:solidFill>
+                  <a:srgbClr val="000000"/>
+                </a:solidFill>
+                <a:latin typeface="Arial"/>
+                <a:ea typeface="DejaVu Sans"/>
               </a:rPr>
               <a:t>physician reference display, encounter id, patient id, and the URL </a:t>
             </a:r>
@@ -13303,13 +13401,21 @@
             </a:pPr>
             <a:r>
               <a:rPr b="0" lang="en-US" sz="1800" spc="-1" strike="noStrike">
-                <a:latin typeface="Arial"/>
+                <a:solidFill>
+                  <a:srgbClr val="000000"/>
+                </a:solidFill>
+                <a:latin typeface="Arial"/>
+                <a:ea typeface="DejaVu Sans"/>
               </a:rPr>
               <a:t>            </a:t>
             </a:r>
             <a:r>
               <a:rPr b="0" lang="en-US" sz="1800" spc="-1" strike="noStrike">
-                <a:latin typeface="Arial"/>
+                <a:solidFill>
+                  <a:srgbClr val="000000"/>
+                </a:solidFill>
+                <a:latin typeface="Arial"/>
+                <a:ea typeface="DejaVu Sans"/>
               </a:rPr>
               <a:t>of the the relatedArtifact  </a:t>
             </a:r>
@@ -13325,13 +13431,21 @@
             </a:pPr>
             <a:r>
               <a:rPr b="0" lang="en-US" sz="1800" spc="-1" strike="noStrike">
-                <a:latin typeface="Arial"/>
+                <a:solidFill>
+                  <a:srgbClr val="000000"/>
+                </a:solidFill>
+                <a:latin typeface="Arial"/>
+                <a:ea typeface="DejaVu Sans"/>
               </a:rPr>
               <a:t>        </a:t>
             </a:r>
             <a:r>
               <a:rPr b="0" lang="en-US" sz="1800" spc="-1" strike="noStrike">
-                <a:latin typeface="Arial"/>
+                <a:solidFill>
+                  <a:srgbClr val="000000"/>
+                </a:solidFill>
+                <a:latin typeface="Arial"/>
+                <a:ea typeface="DejaVu Sans"/>
               </a:rPr>
               <a:t>- Might need to add other items such as the selected Medication resource in </a:t>
             </a:r>
@@ -13347,13 +13461,21 @@
             </a:pPr>
             <a:r>
               <a:rPr b="0" lang="en-US" sz="1800" spc="-1" strike="noStrike">
-                <a:latin typeface="Arial"/>
+                <a:solidFill>
+                  <a:srgbClr val="000000"/>
+                </a:solidFill>
+                <a:latin typeface="Arial"/>
+                <a:ea typeface="DejaVu Sans"/>
               </a:rPr>
               <a:t>          ‘</a:t>
             </a:r>
             <a:r>
               <a:rPr b="0" lang="en-US" sz="1800" spc="-1" strike="noStrike">
-                <a:latin typeface="Arial"/>
+                <a:solidFill>
+                  <a:srgbClr val="000000"/>
+                </a:solidFill>
+                <a:latin typeface="Arial"/>
+                <a:ea typeface="DejaVu Sans"/>
               </a:rPr>
               <a:t>draftOrders’</a:t>
             </a:r>
@@ -13379,6 +13501,9 @@
             </a:pPr>
             <a:r>
               <a:rPr b="0" lang="en-US" sz="1800" spc="-1" strike="noStrike">
+                <a:solidFill>
+                  <a:srgbClr val="000000"/>
+                </a:solidFill>
                 <a:latin typeface="Arial"/>
                 <a:ea typeface="Noto Sans CJK SC"/>
               </a:rPr>
@@ -13396,6 +13521,9 @@
             </a:pPr>
             <a:r>
               <a:rPr b="0" lang="en-US" sz="1800" spc="-1" strike="noStrike">
+                <a:solidFill>
+                  <a:srgbClr val="000000"/>
+                </a:solidFill>
                 <a:latin typeface="Arial"/>
                 <a:ea typeface="Noto Sans CJK SC"/>
               </a:rPr>
@@ -13423,6 +13551,9 @@
             </a:pPr>
             <a:r>
               <a:rPr b="0" lang="en-US" sz="1800" spc="-1" strike="noStrike">
+                <a:solidFill>
+                  <a:srgbClr val="000000"/>
+                </a:solidFill>
                 <a:latin typeface="Arial"/>
                 <a:ea typeface="Noto Sans CJK SC"/>
               </a:rPr>
@@ -13430,6 +13561,9 @@
             </a:r>
             <a:r>
               <a:rPr b="0" lang="en-US" sz="1800" spc="-1" strike="noStrike">
+                <a:solidFill>
+                  <a:srgbClr val="000000"/>
+                </a:solidFill>
                 <a:latin typeface="Arial"/>
                 <a:ea typeface="Noto Sans CJK SC"/>
               </a:rPr>
@@ -13480,7 +13614,7 @@
         <p:spPr>
           <a:xfrm>
             <a:off x="504000" y="363240"/>
-            <a:ext cx="9070920" cy="671040"/>
+            <a:ext cx="9070560" cy="670680"/>
           </a:xfrm>
           <a:prstGeom prst="rect">
             <a:avLst/>
@@ -13508,9 +13642,13 @@
             </a:pPr>
             <a:r>
               <a:rPr b="0" lang="en-US" sz="4400" spc="-1" strike="noStrike">
-                <a:latin typeface="Arial"/>
-              </a:rPr>
-              <a:t>Discussion</a:t>
+                <a:solidFill>
+                  <a:srgbClr val="000000"/>
+                </a:solidFill>
+                <a:latin typeface="Arial"/>
+                <a:ea typeface="DejaVu Sans"/>
+              </a:rPr>
+              <a:t>Discussion (2/7)</a:t>
             </a:r>
             <a:endParaRPr b="0" lang="en-US" sz="4400" spc="-1" strike="noStrike">
               <a:latin typeface="Arial"/>
@@ -13527,7 +13665,7 @@
         <p:spPr>
           <a:xfrm>
             <a:off x="2743200" y="1097280"/>
-            <a:ext cx="4694400" cy="363960"/>
+            <a:ext cx="4694040" cy="363960"/>
           </a:xfrm>
           <a:prstGeom prst="rect">
             <a:avLst/>
@@ -13555,7 +13693,11 @@
             </a:pPr>
             <a:r>
               <a:rPr b="0" lang="en-US" sz="1800" spc="-1" strike="noStrike">
-                <a:latin typeface="Arial"/>
+                <a:solidFill>
+                  <a:srgbClr val="000000"/>
+                </a:solidFill>
+                <a:latin typeface="Arial"/>
+                <a:ea typeface="DejaVu Sans"/>
               </a:rPr>
               <a:t>Note: intent to ballot deadline 3 weeks away!</a:t>
             </a:r>
@@ -13567,14 +13709,14 @@
       </p:sp>
       <p:sp>
         <p:nvSpPr>
-          <p:cNvPr id="303" name="TextShape 3"/>
-          <p:cNvSpPr txBox="1"/>
+          <p:cNvPr id="303" name="CustomShape 3"/>
+          <p:cNvSpPr/>
           <p:nvPr/>
         </p:nvSpPr>
         <p:spPr>
           <a:xfrm>
             <a:off x="274320" y="1611000"/>
-            <a:ext cx="9425160" cy="3673800"/>
+            <a:ext cx="9424800" cy="3930120"/>
           </a:xfrm>
           <a:prstGeom prst="rect">
             <a:avLst/>
@@ -13584,11 +13726,22 @@
             <a:noFill/>
           </a:ln>
         </p:spPr>
+        <p:style>
+          <a:lnRef idx="0"/>
+          <a:fillRef idx="0"/>
+          <a:effectRef idx="0"/>
+          <a:fontRef idx="minor"/>
+        </p:style>
         <p:txBody>
           <a:bodyPr lIns="90000" rIns="90000" tIns="45000" bIns="45000">
             <a:spAutoFit/>
           </a:bodyPr>
           <a:p>
+            <a:pPr>
+              <a:lnSpc>
+                <a:spcPct val="100000"/>
+              </a:lnSpc>
+            </a:pPr>
             <a:r>
               <a:rPr b="0" lang="en-US" sz="1800" spc="-1" strike="noStrike">
                 <a:latin typeface="Arial"/>
@@ -13600,6 +13753,11 @@
             </a:endParaRPr>
           </a:p>
           <a:p>
+            <a:pPr>
+              <a:lnSpc>
+                <a:spcPct val="100000"/>
+              </a:lnSpc>
+            </a:pPr>
             <a:r>
               <a:rPr b="0" lang="en-US" sz="1800" spc="-1" strike="noStrike">
                 <a:latin typeface="Arial"/>
@@ -13611,6 +13769,11 @@
             </a:endParaRPr>
           </a:p>
           <a:p>
+            <a:pPr>
+              <a:lnSpc>
+                <a:spcPct val="100000"/>
+              </a:lnSpc>
+            </a:pPr>
             <a:r>
               <a:rPr b="0" lang="en-US" sz="1800" spc="-1" strike="noStrike">
                 <a:latin typeface="Arial"/>
@@ -13622,6 +13785,11 @@
             </a:endParaRPr>
           </a:p>
           <a:p>
+            <a:pPr>
+              <a:lnSpc>
+                <a:spcPct val="100000"/>
+              </a:lnSpc>
+            </a:pPr>
             <a:r>
               <a:rPr b="0" lang="en-US" sz="1800" spc="-1" strike="noStrike">
                 <a:latin typeface="Arial"/>
@@ -13633,6 +13801,11 @@
             </a:endParaRPr>
           </a:p>
           <a:p>
+            <a:pPr>
+              <a:lnSpc>
+                <a:spcPct val="100000"/>
+              </a:lnSpc>
+            </a:pPr>
             <a:r>
               <a:rPr b="0" lang="en-US" sz="1800" spc="-1" strike="noStrike">
                 <a:latin typeface="Arial"/>
@@ -13644,11 +13817,21 @@
             </a:endParaRPr>
           </a:p>
           <a:p>
+            <a:pPr>
+              <a:lnSpc>
+                <a:spcPct val="100000"/>
+              </a:lnSpc>
+            </a:pPr>
             <a:endParaRPr b="0" lang="en-US" sz="1800" spc="-1" strike="noStrike">
               <a:latin typeface="Arial"/>
             </a:endParaRPr>
           </a:p>
           <a:p>
+            <a:pPr>
+              <a:lnSpc>
+                <a:spcPct val="100000"/>
+              </a:lnSpc>
+            </a:pPr>
             <a:r>
               <a:rPr b="0" lang="en-US" sz="1800" spc="-1" strike="noStrike">
                 <a:latin typeface="Arial"/>
@@ -13660,6 +13843,11 @@
             </a:endParaRPr>
           </a:p>
           <a:p>
+            <a:pPr>
+              <a:lnSpc>
+                <a:spcPct val="100000"/>
+              </a:lnSpc>
+            </a:pPr>
             <a:r>
               <a:rPr b="0" lang="en-US" sz="1800" spc="-1" strike="noStrike">
                 <a:latin typeface="Arial"/>
@@ -13671,11 +13859,21 @@
             </a:endParaRPr>
           </a:p>
           <a:p>
+            <a:pPr>
+              <a:lnSpc>
+                <a:spcPct val="100000"/>
+              </a:lnSpc>
+            </a:pPr>
             <a:endParaRPr b="0" lang="en-US" sz="1800" spc="-1" strike="noStrike">
               <a:latin typeface="Arial"/>
             </a:endParaRPr>
           </a:p>
           <a:p>
+            <a:pPr>
+              <a:lnSpc>
+                <a:spcPct val="100000"/>
+              </a:lnSpc>
+            </a:pPr>
             <a:r>
               <a:rPr b="0" lang="en-US" sz="1800" spc="-1" strike="noStrike">
                 <a:latin typeface="Arial"/>
@@ -13687,6 +13885,11 @@
             </a:endParaRPr>
           </a:p>
           <a:p>
+            <a:pPr>
+              <a:lnSpc>
+                <a:spcPct val="100000"/>
+              </a:lnSpc>
+            </a:pPr>
             <a:r>
               <a:rPr b="0" lang="en-US" sz="1800" spc="-1" strike="noStrike">
                 <a:latin typeface="Arial"/>
@@ -13698,6 +13901,11 @@
             </a:endParaRPr>
           </a:p>
           <a:p>
+            <a:pPr>
+              <a:lnSpc>
+                <a:spcPct val="100000"/>
+              </a:lnSpc>
+            </a:pPr>
             <a:r>
               <a:rPr b="0" lang="en-US" sz="1800" spc="-1" strike="noStrike">
                 <a:latin typeface="Arial"/>
@@ -13709,6 +13917,11 @@
             </a:endParaRPr>
           </a:p>
           <a:p>
+            <a:pPr>
+              <a:lnSpc>
+                <a:spcPct val="100000"/>
+              </a:lnSpc>
+            </a:pPr>
             <a:r>
               <a:rPr b="0" lang="en-US" sz="1800" spc="-1" strike="noStrike">
                 <a:latin typeface="Arial"/>
@@ -13720,6 +13933,11 @@
             </a:endParaRPr>
           </a:p>
           <a:p>
+            <a:pPr>
+              <a:lnSpc>
+                <a:spcPct val="100000"/>
+              </a:lnSpc>
+            </a:pPr>
             <a:endParaRPr b="0" lang="en-US" sz="1800" spc="-1" strike="noStrike">
               <a:latin typeface="Arial"/>
             </a:endParaRPr>
@@ -13764,8 +13982,8 @@
         </p:nvSpPr>
         <p:spPr>
           <a:xfrm>
-            <a:off x="504000" y="226080"/>
-            <a:ext cx="9070920" cy="945720"/>
+            <a:off x="504000" y="363240"/>
+            <a:ext cx="9070560" cy="670680"/>
           </a:xfrm>
           <a:prstGeom prst="rect">
             <a:avLst/>
@@ -13781,6 +13999,31 @@
           <a:effectRef idx="0"/>
           <a:fontRef idx="minor"/>
         </p:style>
+        <p:txBody>
+          <a:bodyPr lIns="0" rIns="0" tIns="0" bIns="0" anchor="ctr">
+            <a:spAutoFit/>
+          </a:bodyPr>
+          <a:p>
+            <a:pPr algn="ctr">
+              <a:lnSpc>
+                <a:spcPct val="100000"/>
+              </a:lnSpc>
+            </a:pPr>
+            <a:r>
+              <a:rPr b="0" lang="en-US" sz="4400" spc="-1" strike="noStrike">
+                <a:solidFill>
+                  <a:srgbClr val="000000"/>
+                </a:solidFill>
+                <a:latin typeface="Arial"/>
+                <a:ea typeface="DejaVu Sans"/>
+              </a:rPr>
+              <a:t>TODOs (2/19): </a:t>
+            </a:r>
+            <a:endParaRPr b="0" lang="en-US" sz="4400" spc="-1" strike="noStrike">
+              <a:latin typeface="Arial"/>
+            </a:endParaRPr>
+          </a:p>
+        </p:txBody>
       </p:sp>
       <p:sp>
         <p:nvSpPr>
@@ -13790,8 +14033,8 @@
         </p:nvSpPr>
         <p:spPr>
           <a:xfrm>
-            <a:off x="504000" y="1326600"/>
-            <a:ext cx="4426200" cy="3287520"/>
+            <a:off x="310320" y="1098360"/>
+            <a:ext cx="9424800" cy="3656520"/>
           </a:xfrm>
           <a:prstGeom prst="rect">
             <a:avLst/>
@@ -13807,58 +14050,145 @@
           <a:effectRef idx="0"/>
           <a:fontRef idx="minor"/>
         </p:style>
-      </p:sp>
-      <p:sp>
-        <p:nvSpPr>
-          <p:cNvPr id="306" name="CustomShape 3"/>
-          <p:cNvSpPr/>
-          <p:nvPr/>
-        </p:nvSpPr>
-        <p:spPr>
-          <a:xfrm>
-            <a:off x="5152680" y="1326600"/>
-            <a:ext cx="4426200" cy="1567440"/>
-          </a:xfrm>
-          <a:prstGeom prst="rect">
-            <a:avLst/>
-          </a:prstGeom>
-          <a:noFill/>
-          <a:ln>
-            <a:noFill/>
-          </a:ln>
-        </p:spPr>
-        <p:style>
-          <a:lnRef idx="0"/>
-          <a:fillRef idx="0"/>
-          <a:effectRef idx="0"/>
-          <a:fontRef idx="minor"/>
-        </p:style>
-      </p:sp>
-      <p:sp>
-        <p:nvSpPr>
-          <p:cNvPr id="307" name="CustomShape 4"/>
-          <p:cNvSpPr/>
-          <p:nvPr/>
-        </p:nvSpPr>
-        <p:spPr>
-          <a:xfrm>
-            <a:off x="5152680" y="3044160"/>
-            <a:ext cx="4426200" cy="1567440"/>
-          </a:xfrm>
-          <a:prstGeom prst="rect">
-            <a:avLst/>
-          </a:prstGeom>
-          <a:noFill/>
-          <a:ln>
-            <a:noFill/>
-          </a:ln>
-        </p:spPr>
-        <p:style>
-          <a:lnRef idx="0"/>
-          <a:fillRef idx="0"/>
-          <a:effectRef idx="0"/>
-          <a:fontRef idx="minor"/>
-        </p:style>
+        <p:txBody>
+          <a:bodyPr lIns="90000" rIns="90000" tIns="45000" bIns="45000">
+            <a:spAutoFit/>
+          </a:bodyPr>
+          <a:p>
+            <a:pPr>
+              <a:lnSpc>
+                <a:spcPct val="100000"/>
+              </a:lnSpc>
+            </a:pPr>
+            <a:r>
+              <a:rPr b="0" lang="en-US" sz="1800" spc="-1" strike="noStrike">
+                <a:latin typeface="Arial"/>
+              </a:rPr>
+              <a:t>- We agreed that the mechanism for configuration and coordination is what we will</a:t>
+            </a:r>
+            <a:endParaRPr b="0" lang="en-US" sz="1800" spc="-1" strike="noStrike">
+              <a:latin typeface="Arial"/>
+            </a:endParaRPr>
+          </a:p>
+          <a:p>
+            <a:pPr>
+              <a:lnSpc>
+                <a:spcPct val="100000"/>
+              </a:lnSpc>
+            </a:pPr>
+            <a:r>
+              <a:rPr b="0" lang="en-US" sz="1800" spc="-1" strike="noStrike">
+                <a:latin typeface="Arial"/>
+              </a:rPr>
+              <a:t>ballot with example configuration options and the </a:t>
+            </a:r>
+            <a:r>
+              <a:rPr b="1" lang="en-US" sz="1800" spc="-1" strike="noStrike">
+                <a:latin typeface="Arial"/>
+              </a:rPr>
+              <a:t>two </a:t>
+            </a:r>
+            <a:r>
+              <a:rPr b="0" lang="en-US" sz="1800" spc="-1" strike="noStrike">
+                <a:latin typeface="Arial"/>
+              </a:rPr>
+              <a:t>required options that enable coordination between order-select and order-sign</a:t>
+            </a:r>
+            <a:endParaRPr b="0" lang="en-US" sz="1800" spc="-1" strike="noStrike">
+              <a:latin typeface="Arial"/>
+            </a:endParaRPr>
+          </a:p>
+          <a:p>
+            <a:pPr>
+              <a:lnSpc>
+                <a:spcPct val="100000"/>
+              </a:lnSpc>
+            </a:pPr>
+            <a:r>
+              <a:rPr b="0" lang="en-US" sz="1800" spc="-1" strike="noStrike">
+                <a:latin typeface="Arial"/>
+              </a:rPr>
+              <a:t>- We agree to cache the URI of the plan definition at order select as the reference to knowledge artifact</a:t>
+            </a:r>
+            <a:endParaRPr b="0" lang="en-US" sz="1800" spc="-1" strike="noStrike">
+              <a:latin typeface="Arial"/>
+            </a:endParaRPr>
+          </a:p>
+          <a:p>
+            <a:pPr>
+              <a:lnSpc>
+                <a:spcPct val="100000"/>
+              </a:lnSpc>
+            </a:pPr>
+            <a:r>
+              <a:rPr b="0" lang="en-US" sz="1800" spc="-1" strike="noStrike">
+                <a:latin typeface="Arial"/>
+              </a:rPr>
+              <a:t>- We agreed to add the order select “selected drug” ID to cache and use that at order sign so that filtering is based on the following: URI of knowledge artifact + encounter id + patient id + practitioner id + selected medication</a:t>
+            </a:r>
+            <a:endParaRPr b="0" lang="en-US" sz="1800" spc="-1" strike="noStrike">
+              <a:latin typeface="Arial"/>
+            </a:endParaRPr>
+          </a:p>
+          <a:p>
+            <a:pPr>
+              <a:lnSpc>
+                <a:spcPct val="100000"/>
+              </a:lnSpc>
+            </a:pPr>
+            <a:r>
+              <a:rPr b="0" lang="en-US" sz="1800" spc="-1" strike="noStrike">
+                <a:latin typeface="Arial"/>
+              </a:rPr>
+              <a:t>- We agreed that the IG will provide clarification in the form of state and activity diagrams on how the server needs to coordinate filtering</a:t>
+            </a:r>
+            <a:endParaRPr b="0" lang="en-US" sz="1800" spc="-1" strike="noStrike">
+              <a:latin typeface="Arial"/>
+            </a:endParaRPr>
+          </a:p>
+          <a:p>
+            <a:pPr>
+              <a:lnSpc>
+                <a:spcPct val="100000"/>
+              </a:lnSpc>
+            </a:pPr>
+            <a:r>
+              <a:rPr b="0" lang="en-US" sz="1800" spc="-1" strike="noStrike">
+                <a:latin typeface="Arial"/>
+              </a:rPr>
+              <a:t>- We agreed that we will SUGGEST returning an information card mentioning </a:t>
+            </a:r>
+            <a:endParaRPr b="0" lang="en-US" sz="1800" spc="-1" strike="noStrike">
+              <a:latin typeface="Arial"/>
+            </a:endParaRPr>
+          </a:p>
+          <a:p>
+            <a:pPr>
+              <a:lnSpc>
+                <a:spcPct val="100000"/>
+              </a:lnSpc>
+            </a:pPr>
+            <a:r>
+              <a:rPr b="0" lang="en-US" sz="1800" spc="-1" strike="noStrike">
+                <a:latin typeface="Arial"/>
+              </a:rPr>
+              <a:t>- We will NOT extend configuration so it indicates optional vs required configs</a:t>
+            </a:r>
+            <a:endParaRPr b="0" lang="en-US" sz="1800" spc="-1" strike="noStrike">
+              <a:latin typeface="Arial"/>
+            </a:endParaRPr>
+          </a:p>
+          <a:p>
+            <a:pPr>
+              <a:lnSpc>
+                <a:spcPct val="100000"/>
+              </a:lnSpc>
+            </a:pPr>
+            <a:endParaRPr b="0" lang="en-US" sz="1800" spc="-1" strike="noStrike">
+              <a:latin typeface="Arial"/>
+            </a:endParaRPr>
+          </a:p>
+        </p:txBody>
       </p:sp>
     </p:spTree>
   </p:cSld>
@@ -13892,14 +14222,14 @@
       </p:grpSpPr>
       <p:sp>
         <p:nvSpPr>
-          <p:cNvPr id="308" name="CustomShape 1"/>
+          <p:cNvPr id="306" name="CustomShape 1"/>
           <p:cNvSpPr/>
           <p:nvPr/>
         </p:nvSpPr>
         <p:spPr>
           <a:xfrm>
             <a:off x="504000" y="226080"/>
-            <a:ext cx="9070920" cy="945720"/>
+            <a:ext cx="9070560" cy="945360"/>
           </a:xfrm>
           <a:prstGeom prst="rect">
             <a:avLst/>
@@ -13918,14 +14248,14 @@
       </p:sp>
       <p:sp>
         <p:nvSpPr>
-          <p:cNvPr id="309" name="CustomShape 2"/>
+          <p:cNvPr id="307" name="CustomShape 2"/>
           <p:cNvSpPr/>
           <p:nvPr/>
         </p:nvSpPr>
         <p:spPr>
           <a:xfrm>
             <a:off x="504000" y="1326600"/>
-            <a:ext cx="4426200" cy="1567440"/>
+            <a:ext cx="4425840" cy="3287160"/>
           </a:xfrm>
           <a:prstGeom prst="rect">
             <a:avLst/>
@@ -13944,14 +14274,14 @@
       </p:sp>
       <p:sp>
         <p:nvSpPr>
-          <p:cNvPr id="310" name="CustomShape 3"/>
+          <p:cNvPr id="308" name="CustomShape 3"/>
           <p:cNvSpPr/>
           <p:nvPr/>
         </p:nvSpPr>
         <p:spPr>
           <a:xfrm>
             <a:off x="5152680" y="1326600"/>
-            <a:ext cx="4426200" cy="1567440"/>
+            <a:ext cx="4425840" cy="1567080"/>
           </a:xfrm>
           <a:prstGeom prst="rect">
             <a:avLst/>
@@ -13970,14 +14300,14 @@
       </p:sp>
       <p:sp>
         <p:nvSpPr>
-          <p:cNvPr id="311" name="CustomShape 4"/>
+          <p:cNvPr id="309" name="CustomShape 4"/>
           <p:cNvSpPr/>
           <p:nvPr/>
         </p:nvSpPr>
         <p:spPr>
           <a:xfrm>
-            <a:off x="504000" y="3044160"/>
-            <a:ext cx="9070920" cy="1567440"/>
+            <a:off x="5152680" y="3044160"/>
+            <a:ext cx="4425840" cy="1567080"/>
           </a:xfrm>
           <a:prstGeom prst="rect">
             <a:avLst/>
@@ -14026,14 +14356,14 @@
       </p:grpSpPr>
       <p:sp>
         <p:nvSpPr>
-          <p:cNvPr id="312" name="CustomShape 1"/>
+          <p:cNvPr id="310" name="CustomShape 1"/>
           <p:cNvSpPr/>
           <p:nvPr/>
         </p:nvSpPr>
         <p:spPr>
           <a:xfrm>
             <a:off x="504000" y="226080"/>
-            <a:ext cx="9070920" cy="945720"/>
+            <a:ext cx="9070560" cy="945360"/>
           </a:xfrm>
           <a:prstGeom prst="rect">
             <a:avLst/>
@@ -14052,14 +14382,14 @@
       </p:sp>
       <p:sp>
         <p:nvSpPr>
-          <p:cNvPr id="313" name="CustomShape 2"/>
+          <p:cNvPr id="311" name="CustomShape 2"/>
           <p:cNvSpPr/>
           <p:nvPr/>
         </p:nvSpPr>
         <p:spPr>
           <a:xfrm>
             <a:off x="504000" y="1326600"/>
-            <a:ext cx="9070920" cy="1567440"/>
+            <a:ext cx="4425840" cy="1567080"/>
           </a:xfrm>
           <a:prstGeom prst="rect">
             <a:avLst/>
@@ -14078,14 +14408,40 @@
       </p:sp>
       <p:sp>
         <p:nvSpPr>
-          <p:cNvPr id="314" name="CustomShape 3"/>
+          <p:cNvPr id="312" name="CustomShape 3"/>
           <p:cNvSpPr/>
           <p:nvPr/>
         </p:nvSpPr>
         <p:spPr>
           <a:xfrm>
+            <a:off x="5152680" y="1326600"/>
+            <a:ext cx="4425840" cy="1567080"/>
+          </a:xfrm>
+          <a:prstGeom prst="rect">
+            <a:avLst/>
+          </a:prstGeom>
+          <a:noFill/>
+          <a:ln>
+            <a:noFill/>
+          </a:ln>
+        </p:spPr>
+        <p:style>
+          <a:lnRef idx="0"/>
+          <a:fillRef idx="0"/>
+          <a:effectRef idx="0"/>
+          <a:fontRef idx="minor"/>
+        </p:style>
+      </p:sp>
+      <p:sp>
+        <p:nvSpPr>
+          <p:cNvPr id="313" name="CustomShape 4"/>
+          <p:cNvSpPr/>
+          <p:nvPr/>
+        </p:nvSpPr>
+        <p:spPr>
+          <a:xfrm>
             <a:off x="504000" y="3044160"/>
-            <a:ext cx="9070920" cy="1567440"/>
+            <a:ext cx="9070560" cy="1567080"/>
           </a:xfrm>
           <a:prstGeom prst="rect">
             <a:avLst/>
@@ -14134,14 +14490,14 @@
       </p:grpSpPr>
       <p:sp>
         <p:nvSpPr>
-          <p:cNvPr id="315" name="CustomShape 1"/>
+          <p:cNvPr id="314" name="CustomShape 1"/>
           <p:cNvSpPr/>
           <p:nvPr/>
         </p:nvSpPr>
         <p:spPr>
           <a:xfrm>
             <a:off x="504000" y="226080"/>
-            <a:ext cx="9070920" cy="945720"/>
+            <a:ext cx="9070560" cy="945360"/>
           </a:xfrm>
           <a:prstGeom prst="rect">
             <a:avLst/>
@@ -14160,14 +14516,14 @@
       </p:sp>
       <p:sp>
         <p:nvSpPr>
-          <p:cNvPr id="316" name="CustomShape 2"/>
+          <p:cNvPr id="315" name="CustomShape 2"/>
           <p:cNvSpPr/>
           <p:nvPr/>
         </p:nvSpPr>
         <p:spPr>
           <a:xfrm>
             <a:off x="504000" y="1326600"/>
-            <a:ext cx="4426200" cy="1567440"/>
+            <a:ext cx="9070560" cy="1567080"/>
           </a:xfrm>
           <a:prstGeom prst="rect">
             <a:avLst/>
@@ -14186,66 +14542,14 @@
       </p:sp>
       <p:sp>
         <p:nvSpPr>
-          <p:cNvPr id="317" name="CustomShape 3"/>
+          <p:cNvPr id="316" name="CustomShape 3"/>
           <p:cNvSpPr/>
           <p:nvPr/>
         </p:nvSpPr>
         <p:spPr>
           <a:xfrm>
-            <a:off x="5152680" y="1326600"/>
-            <a:ext cx="4426200" cy="1567440"/>
-          </a:xfrm>
-          <a:prstGeom prst="rect">
-            <a:avLst/>
-          </a:prstGeom>
-          <a:noFill/>
-          <a:ln>
-            <a:noFill/>
-          </a:ln>
-        </p:spPr>
-        <p:style>
-          <a:lnRef idx="0"/>
-          <a:fillRef idx="0"/>
-          <a:effectRef idx="0"/>
-          <a:fontRef idx="minor"/>
-        </p:style>
-      </p:sp>
-      <p:sp>
-        <p:nvSpPr>
-          <p:cNvPr id="318" name="CustomShape 4"/>
-          <p:cNvSpPr/>
-          <p:nvPr/>
-        </p:nvSpPr>
-        <p:spPr>
-          <a:xfrm>
             <a:off x="504000" y="3044160"/>
-            <a:ext cx="4426200" cy="1567440"/>
-          </a:xfrm>
-          <a:prstGeom prst="rect">
-            <a:avLst/>
-          </a:prstGeom>
-          <a:noFill/>
-          <a:ln>
-            <a:noFill/>
-          </a:ln>
-        </p:spPr>
-        <p:style>
-          <a:lnRef idx="0"/>
-          <a:fillRef idx="0"/>
-          <a:effectRef idx="0"/>
-          <a:fontRef idx="minor"/>
-        </p:style>
-      </p:sp>
-      <p:sp>
-        <p:nvSpPr>
-          <p:cNvPr id="319" name="CustomShape 5"/>
-          <p:cNvSpPr/>
-          <p:nvPr/>
-        </p:nvSpPr>
-        <p:spPr>
-          <a:xfrm>
-            <a:off x="5152680" y="3044160"/>
-            <a:ext cx="4426200" cy="1567440"/>
+            <a:ext cx="9070560" cy="1567080"/>
           </a:xfrm>
           <a:prstGeom prst="rect">
             <a:avLst/>
@@ -14294,14 +14598,14 @@
       </p:grpSpPr>
       <p:sp>
         <p:nvSpPr>
-          <p:cNvPr id="320" name="CustomShape 1"/>
+          <p:cNvPr id="317" name="CustomShape 1"/>
           <p:cNvSpPr/>
           <p:nvPr/>
         </p:nvSpPr>
         <p:spPr>
           <a:xfrm>
             <a:off x="504000" y="226080"/>
-            <a:ext cx="9070920" cy="945720"/>
+            <a:ext cx="9070560" cy="945360"/>
           </a:xfrm>
           <a:prstGeom prst="rect">
             <a:avLst/>
@@ -14320,14 +14624,14 @@
       </p:sp>
       <p:sp>
         <p:nvSpPr>
-          <p:cNvPr id="321" name="CustomShape 2"/>
+          <p:cNvPr id="318" name="CustomShape 2"/>
           <p:cNvSpPr/>
           <p:nvPr/>
         </p:nvSpPr>
         <p:spPr>
           <a:xfrm>
             <a:off x="504000" y="1326600"/>
-            <a:ext cx="2919960" cy="1567440"/>
+            <a:ext cx="4425840" cy="1567080"/>
           </a:xfrm>
           <a:prstGeom prst="rect">
             <a:avLst/>
@@ -14346,14 +14650,14 @@
       </p:sp>
       <p:sp>
         <p:nvSpPr>
-          <p:cNvPr id="322" name="CustomShape 3"/>
+          <p:cNvPr id="319" name="CustomShape 3"/>
           <p:cNvSpPr/>
           <p:nvPr/>
         </p:nvSpPr>
         <p:spPr>
           <a:xfrm>
-            <a:off x="3571200" y="1326600"/>
-            <a:ext cx="2919960" cy="1567440"/>
+            <a:off x="5152680" y="1326600"/>
+            <a:ext cx="4425840" cy="1567080"/>
           </a:xfrm>
           <a:prstGeom prst="rect">
             <a:avLst/>
@@ -14372,14 +14676,14 @@
       </p:sp>
       <p:sp>
         <p:nvSpPr>
-          <p:cNvPr id="323" name="CustomShape 4"/>
+          <p:cNvPr id="320" name="CustomShape 4"/>
           <p:cNvSpPr/>
           <p:nvPr/>
         </p:nvSpPr>
         <p:spPr>
           <a:xfrm>
-            <a:off x="6638040" y="1326600"/>
-            <a:ext cx="2919960" cy="1567440"/>
+            <a:off x="504000" y="3044160"/>
+            <a:ext cx="4425840" cy="1567080"/>
           </a:xfrm>
           <a:prstGeom prst="rect">
             <a:avLst/>
@@ -14398,14 +14702,14 @@
       </p:sp>
       <p:sp>
         <p:nvSpPr>
-          <p:cNvPr id="324" name="CustomShape 5"/>
+          <p:cNvPr id="321" name="CustomShape 5"/>
           <p:cNvSpPr/>
           <p:nvPr/>
         </p:nvSpPr>
         <p:spPr>
           <a:xfrm>
-            <a:off x="504000" y="3044160"/>
-            <a:ext cx="2919960" cy="1567440"/>
+            <a:off x="5152680" y="3044160"/>
+            <a:ext cx="4425840" cy="1567080"/>
           </a:xfrm>
           <a:prstGeom prst="rect">
             <a:avLst/>
@@ -14422,16 +14726,46 @@
           <a:fontRef idx="minor"/>
         </p:style>
       </p:sp>
-      <p:sp>
-        <p:nvSpPr>
-          <p:cNvPr id="325" name="CustomShape 6"/>
+    </p:spTree>
+  </p:cSld>
+  <mc:AlternateContent>
+    <mc:Choice Requires="p14">
+      <p:transition spd="slow" p14:dur="2000"/>
+    </mc:Choice>
+    <mc:Fallback>
+      <p:transition spd="slow"/>
+    </mc:Fallback>
+  </mc:AlternateContent>
+</p:sld>
+</file>
+
+<file path=ppt/slides/slide19.xml><?xml version="1.0" encoding="utf-8"?>
+<p:sld xmlns:a="http://schemas.openxmlformats.org/drawingml/2006/main" xmlns:p="http://schemas.openxmlformats.org/presentationml/2006/main" xmlns:r="http://schemas.openxmlformats.org/officeDocument/2006/relationships" xmlns:p14="http://schemas.microsoft.com/office/powerpoint/2010/main" xmlns:p15="http://schemas.microsoft.com/office/powerpoint/2012/main" xmlns:mc="http://schemas.openxmlformats.org/markup-compatibility/2006">
+  <p:cSld>
+    <p:spTree>
+      <p:nvGrpSpPr>
+        <p:cNvPr id="1" name=""/>
+        <p:cNvGrpSpPr/>
+        <p:nvPr/>
+      </p:nvGrpSpPr>
+      <p:grpSpPr>
+        <a:xfrm>
+          <a:off x="0" y="0"/>
+          <a:ext cx="0" cy="0"/>
+          <a:chOff x="0" y="0"/>
+          <a:chExt cx="0" cy="0"/>
+        </a:xfrm>
+      </p:grpSpPr>
+      <p:sp>
+        <p:nvSpPr>
+          <p:cNvPr id="322" name="CustomShape 1"/>
           <p:cNvSpPr/>
           <p:nvPr/>
         </p:nvSpPr>
         <p:spPr>
           <a:xfrm>
-            <a:off x="3571200" y="3044160"/>
-            <a:ext cx="2919960" cy="1567440"/>
+            <a:off x="504000" y="226080"/>
+            <a:ext cx="9070560" cy="945360"/>
           </a:xfrm>
           <a:prstGeom prst="rect">
             <a:avLst/>
@@ -14450,14 +14784,144 @@
       </p:sp>
       <p:sp>
         <p:nvSpPr>
-          <p:cNvPr id="326" name="CustomShape 7"/>
+          <p:cNvPr id="323" name="CustomShape 2"/>
           <p:cNvSpPr/>
           <p:nvPr/>
         </p:nvSpPr>
         <p:spPr>
           <a:xfrm>
+            <a:off x="504000" y="1326600"/>
+            <a:ext cx="2919600" cy="1567080"/>
+          </a:xfrm>
+          <a:prstGeom prst="rect">
+            <a:avLst/>
+          </a:prstGeom>
+          <a:noFill/>
+          <a:ln>
+            <a:noFill/>
+          </a:ln>
+        </p:spPr>
+        <p:style>
+          <a:lnRef idx="0"/>
+          <a:fillRef idx="0"/>
+          <a:effectRef idx="0"/>
+          <a:fontRef idx="minor"/>
+        </p:style>
+      </p:sp>
+      <p:sp>
+        <p:nvSpPr>
+          <p:cNvPr id="324" name="CustomShape 3"/>
+          <p:cNvSpPr/>
+          <p:nvPr/>
+        </p:nvSpPr>
+        <p:spPr>
+          <a:xfrm>
+            <a:off x="3571200" y="1326600"/>
+            <a:ext cx="2919600" cy="1567080"/>
+          </a:xfrm>
+          <a:prstGeom prst="rect">
+            <a:avLst/>
+          </a:prstGeom>
+          <a:noFill/>
+          <a:ln>
+            <a:noFill/>
+          </a:ln>
+        </p:spPr>
+        <p:style>
+          <a:lnRef idx="0"/>
+          <a:fillRef idx="0"/>
+          <a:effectRef idx="0"/>
+          <a:fontRef idx="minor"/>
+        </p:style>
+      </p:sp>
+      <p:sp>
+        <p:nvSpPr>
+          <p:cNvPr id="325" name="CustomShape 4"/>
+          <p:cNvSpPr/>
+          <p:nvPr/>
+        </p:nvSpPr>
+        <p:spPr>
+          <a:xfrm>
+            <a:off x="6638040" y="1326600"/>
+            <a:ext cx="2919600" cy="1567080"/>
+          </a:xfrm>
+          <a:prstGeom prst="rect">
+            <a:avLst/>
+          </a:prstGeom>
+          <a:noFill/>
+          <a:ln>
+            <a:noFill/>
+          </a:ln>
+        </p:spPr>
+        <p:style>
+          <a:lnRef idx="0"/>
+          <a:fillRef idx="0"/>
+          <a:effectRef idx="0"/>
+          <a:fontRef idx="minor"/>
+        </p:style>
+      </p:sp>
+      <p:sp>
+        <p:nvSpPr>
+          <p:cNvPr id="326" name="CustomShape 5"/>
+          <p:cNvSpPr/>
+          <p:nvPr/>
+        </p:nvSpPr>
+        <p:spPr>
+          <a:xfrm>
+            <a:off x="504000" y="3044160"/>
+            <a:ext cx="2919600" cy="1567080"/>
+          </a:xfrm>
+          <a:prstGeom prst="rect">
+            <a:avLst/>
+          </a:prstGeom>
+          <a:noFill/>
+          <a:ln>
+            <a:noFill/>
+          </a:ln>
+        </p:spPr>
+        <p:style>
+          <a:lnRef idx="0"/>
+          <a:fillRef idx="0"/>
+          <a:effectRef idx="0"/>
+          <a:fontRef idx="minor"/>
+        </p:style>
+      </p:sp>
+      <p:sp>
+        <p:nvSpPr>
+          <p:cNvPr id="327" name="CustomShape 6"/>
+          <p:cNvSpPr/>
+          <p:nvPr/>
+        </p:nvSpPr>
+        <p:spPr>
+          <a:xfrm>
+            <a:off x="3571200" y="3044160"/>
+            <a:ext cx="2919600" cy="1567080"/>
+          </a:xfrm>
+          <a:prstGeom prst="rect">
+            <a:avLst/>
+          </a:prstGeom>
+          <a:noFill/>
+          <a:ln>
+            <a:noFill/>
+          </a:ln>
+        </p:spPr>
+        <p:style>
+          <a:lnRef idx="0"/>
+          <a:fillRef idx="0"/>
+          <a:effectRef idx="0"/>
+          <a:fontRef idx="minor"/>
+        </p:style>
+      </p:sp>
+      <p:sp>
+        <p:nvSpPr>
+          <p:cNvPr id="328" name="CustomShape 7"/>
+          <p:cNvSpPr/>
+          <p:nvPr/>
+        </p:nvSpPr>
+        <p:spPr>
+          <a:xfrm>
             <a:off x="6638040" y="3044160"/>
-            <a:ext cx="2919960" cy="1567440"/>
+            <a:ext cx="2919600" cy="1567080"/>
           </a:xfrm>
           <a:prstGeom prst="rect">
             <a:avLst/>
@@ -14513,7 +14977,7 @@
         <p:spPr>
           <a:xfrm>
             <a:off x="504000" y="363600"/>
-            <a:ext cx="9070920" cy="670680"/>
+            <a:ext cx="9070560" cy="670320"/>
           </a:xfrm>
           <a:prstGeom prst="rect">
             <a:avLst/>
@@ -14564,7 +15028,7 @@
         <p:spPr>
           <a:xfrm>
             <a:off x="504000" y="1326600"/>
-            <a:ext cx="9070920" cy="3287520"/>
+            <a:ext cx="9070560" cy="3287160"/>
           </a:xfrm>
           <a:prstGeom prst="rect">
             <a:avLst/>
@@ -14585,7 +15049,7 @@
             <a:normAutofit/>
           </a:bodyPr>
           <a:p>
-            <a:pPr marL="432000" indent="-323280">
+            <a:pPr marL="432000" indent="-322920">
               <a:lnSpc>
                 <a:spcPct val="100000"/>
               </a:lnSpc>
@@ -14608,7 +15072,7 @@
             </a:endParaRPr>
           </a:p>
           <a:p>
-            <a:pPr lvl="1" marL="864000" indent="-323280">
+            <a:pPr lvl="1" marL="864000" indent="-322920">
               <a:lnSpc>
                 <a:spcPct val="100000"/>
               </a:lnSpc>
@@ -14637,7 +15101,7 @@
             </a:endParaRPr>
           </a:p>
           <a:p>
-            <a:pPr lvl="2" marL="1296000" indent="-287280">
+            <a:pPr lvl="2" marL="1296000" indent="-286920">
               <a:lnSpc>
                 <a:spcPct val="100000"/>
               </a:lnSpc>
@@ -14666,7 +15130,7 @@
             </a:endParaRPr>
           </a:p>
           <a:p>
-            <a:pPr lvl="1" marL="864000" indent="-323280">
+            <a:pPr lvl="1" marL="864000" indent="-322920">
               <a:lnSpc>
                 <a:spcPct val="100000"/>
               </a:lnSpc>
@@ -14695,7 +15159,7 @@
             </a:endParaRPr>
           </a:p>
           <a:p>
-            <a:pPr lvl="2" marL="1296000" indent="-287280">
+            <a:pPr lvl="2" marL="1296000" indent="-286920">
               <a:lnSpc>
                 <a:spcPct val="100000"/>
               </a:lnSpc>
@@ -14764,7 +15228,7 @@
         <p:spPr>
           <a:xfrm>
             <a:off x="504000" y="363600"/>
-            <a:ext cx="9070920" cy="670680"/>
+            <a:ext cx="9070560" cy="670320"/>
           </a:xfrm>
           <a:prstGeom prst="rect">
             <a:avLst/>
@@ -14815,7 +15279,7 @@
         <p:spPr>
           <a:xfrm>
             <a:off x="504000" y="1326600"/>
-            <a:ext cx="9070920" cy="3287520"/>
+            <a:ext cx="9070560" cy="3287160"/>
           </a:xfrm>
           <a:prstGeom prst="rect">
             <a:avLst/>
@@ -14836,7 +15300,7 @@
             <a:normAutofit/>
           </a:bodyPr>
           <a:p>
-            <a:pPr marL="432000" indent="-323280">
+            <a:pPr marL="432000" indent="-322920">
               <a:lnSpc>
                 <a:spcPct val="100000"/>
               </a:lnSpc>
@@ -14859,7 +15323,7 @@
             </a:endParaRPr>
           </a:p>
           <a:p>
-            <a:pPr lvl="1" marL="864000" indent="-323280">
+            <a:pPr lvl="1" marL="864000" indent="-322920">
               <a:lnSpc>
                 <a:spcPct val="100000"/>
               </a:lnSpc>
@@ -14888,7 +15352,7 @@
             </a:endParaRPr>
           </a:p>
           <a:p>
-            <a:pPr lvl="2" marL="1296000" indent="-287280">
+            <a:pPr lvl="2" marL="1296000" indent="-286920">
               <a:lnSpc>
                 <a:spcPct val="100000"/>
               </a:lnSpc>
@@ -14917,7 +15381,7 @@
             </a:endParaRPr>
           </a:p>
           <a:p>
-            <a:pPr lvl="1" marL="864000" indent="-323280">
+            <a:pPr lvl="1" marL="864000" indent="-322920">
               <a:lnSpc>
                 <a:spcPct val="100000"/>
               </a:lnSpc>
@@ -14986,7 +15450,7 @@
         <p:spPr>
           <a:xfrm>
             <a:off x="504000" y="363600"/>
-            <a:ext cx="9070920" cy="670680"/>
+            <a:ext cx="9070560" cy="670320"/>
           </a:xfrm>
           <a:prstGeom prst="rect">
             <a:avLst/>
@@ -15037,7 +15501,7 @@
         <p:spPr>
           <a:xfrm>
             <a:off x="504000" y="1326600"/>
-            <a:ext cx="9070920" cy="3287520"/>
+            <a:ext cx="9070560" cy="3287160"/>
           </a:xfrm>
           <a:prstGeom prst="rect">
             <a:avLst/>
@@ -15058,7 +15522,7 @@
             <a:normAutofit fontScale="35000"/>
           </a:bodyPr>
           <a:p>
-            <a:pPr marL="432000" indent="-323280">
+            <a:pPr marL="432000" indent="-322920">
               <a:lnSpc>
                 <a:spcPct val="100000"/>
               </a:lnSpc>
@@ -15091,7 +15555,7 @@
             </a:endParaRPr>
           </a:p>
           <a:p>
-            <a:pPr lvl="1" marL="864000" indent="-323280">
+            <a:pPr lvl="1" marL="864000" indent="-322920">
               <a:lnSpc>
                 <a:spcPct val="100000"/>
               </a:lnSpc>
@@ -15120,7 +15584,7 @@
             </a:endParaRPr>
           </a:p>
           <a:p>
-            <a:pPr lvl="1" marL="864000" indent="-323280">
+            <a:pPr lvl="1" marL="864000" indent="-322920">
               <a:lnSpc>
                 <a:spcPct val="100000"/>
               </a:lnSpc>
@@ -15149,7 +15613,7 @@
             </a:endParaRPr>
           </a:p>
           <a:p>
-            <a:pPr lvl="1" marL="864000" indent="-323280">
+            <a:pPr lvl="1" marL="864000" indent="-322920">
               <a:lnSpc>
                 <a:spcPct val="100000"/>
               </a:lnSpc>
@@ -15178,7 +15642,7 @@
             </a:endParaRPr>
           </a:p>
           <a:p>
-            <a:pPr lvl="1" marL="864000" indent="-323280">
+            <a:pPr lvl="1" marL="864000" indent="-322920">
               <a:lnSpc>
                 <a:spcPct val="100000"/>
               </a:lnSpc>
@@ -15207,7 +15671,7 @@
             </a:endParaRPr>
           </a:p>
           <a:p>
-            <a:pPr lvl="1" marL="864000" indent="-323280">
+            <a:pPr lvl="1" marL="864000" indent="-322920">
               <a:lnSpc>
                 <a:spcPct val="100000"/>
               </a:lnSpc>
@@ -15276,7 +15740,7 @@
         <p:spPr>
           <a:xfrm>
             <a:off x="504000" y="211680"/>
-            <a:ext cx="9070920" cy="974520"/>
+            <a:ext cx="9070560" cy="974160"/>
           </a:xfrm>
           <a:prstGeom prst="rect">
             <a:avLst/>
@@ -15327,7 +15791,7 @@
         <p:spPr>
           <a:xfrm>
             <a:off x="731520" y="1811880"/>
-            <a:ext cx="8503200" cy="1186920"/>
+            <a:ext cx="8502840" cy="1186920"/>
           </a:xfrm>
           <a:prstGeom prst="rect">
             <a:avLst/>
@@ -15408,7 +15872,7 @@
         <p:spPr>
           <a:xfrm>
             <a:off x="731520" y="3468240"/>
-            <a:ext cx="8503200" cy="1186920"/>
+            <a:ext cx="8502840" cy="1186920"/>
           </a:xfrm>
           <a:prstGeom prst="rect">
             <a:avLst/>
@@ -15519,7 +15983,7 @@
         <p:spPr>
           <a:xfrm>
             <a:off x="504000" y="234000"/>
-            <a:ext cx="9070920" cy="305640"/>
+            <a:ext cx="9070560" cy="305280"/>
           </a:xfrm>
           <a:prstGeom prst="rect">
             <a:avLst/>
@@ -15547,7 +16011,11 @@
             </a:pPr>
             <a:r>
               <a:rPr b="0" lang="en-US" sz="2000" spc="-1" strike="noStrike">
-                <a:latin typeface="Arial"/>
+                <a:solidFill>
+                  <a:srgbClr val="000000"/>
+                </a:solidFill>
+                <a:latin typeface="Arial"/>
+                <a:ea typeface="DejaVu Sans"/>
               </a:rPr>
               <a:t>How Configuration Looks in CDS Hooks</a:t>
             </a:r>
@@ -15565,13 +16033,13 @@
         </p:nvPicPr>
         <p:blipFill>
           <a:blip r:embed="rId1"/>
-          <a:srcRect l="25360" t="33204" r="2067" b="3895"/>
+          <a:srcRect l="25364" t="33207" r="2067" b="3895"/>
           <a:stretch/>
         </p:blipFill>
         <p:spPr>
           <a:xfrm>
             <a:off x="274320" y="1645920"/>
-            <a:ext cx="7314480" cy="3565440"/>
+            <a:ext cx="7314120" cy="3565080"/>
           </a:xfrm>
           <a:prstGeom prst="rect">
             <a:avLst/>
@@ -15590,7 +16058,7 @@
         <p:spPr>
           <a:xfrm>
             <a:off x="422640" y="731520"/>
-            <a:ext cx="4149000" cy="912600"/>
+            <a:ext cx="4148640" cy="912600"/>
           </a:xfrm>
           <a:prstGeom prst="rect">
             <a:avLst/>
@@ -15618,7 +16086,11 @@
             </a:pPr>
             <a:r>
               <a:rPr b="0" lang="en-US" sz="1800" spc="-1" strike="noStrike">
-                <a:latin typeface="Arial"/>
+                <a:solidFill>
+                  <a:srgbClr val="000000"/>
+                </a:solidFill>
+                <a:latin typeface="Arial"/>
+                <a:ea typeface="DejaVu Sans"/>
               </a:rPr>
               <a:t>GET http://localhost:2020/cds-services </a:t>
             </a:r>
@@ -15644,7 +16116,11 @@
             </a:pPr>
             <a:r>
               <a:rPr b="0" lang="en-US" sz="1800" spc="-1" strike="noStrike">
-                <a:latin typeface="Arial"/>
+                <a:solidFill>
+                  <a:srgbClr val="000000"/>
+                </a:solidFill>
+                <a:latin typeface="Arial"/>
+                <a:ea typeface="DejaVu Sans"/>
               </a:rPr>
               <a:t>RESPONSE (order-sign service):</a:t>
             </a:r>
@@ -15693,7 +16169,7 @@
         <p:spPr>
           <a:xfrm>
             <a:off x="504000" y="234000"/>
-            <a:ext cx="9070920" cy="305640"/>
+            <a:ext cx="9070560" cy="305280"/>
           </a:xfrm>
           <a:prstGeom prst="rect">
             <a:avLst/>
@@ -15721,7 +16197,11 @@
             </a:pPr>
             <a:r>
               <a:rPr b="0" lang="en-US" sz="2000" spc="-1" strike="noStrike">
-                <a:latin typeface="Arial"/>
+                <a:solidFill>
+                  <a:srgbClr val="000000"/>
+                </a:solidFill>
+                <a:latin typeface="Arial"/>
+                <a:ea typeface="DejaVu Sans"/>
               </a:rPr>
               <a:t>How Configuration Looks in CDS Hooks Continued</a:t>
             </a:r>
@@ -15740,7 +16220,7 @@
         <p:spPr>
           <a:xfrm>
             <a:off x="422640" y="731520"/>
-            <a:ext cx="5142600" cy="912600"/>
+            <a:ext cx="5142240" cy="912600"/>
           </a:xfrm>
           <a:prstGeom prst="rect">
             <a:avLst/>
@@ -15768,7 +16248,11 @@
             </a:pPr>
             <a:r>
               <a:rPr b="0" lang="en-US" sz="1800" spc="-1" strike="noStrike">
-                <a:latin typeface="Arial"/>
+                <a:solidFill>
+                  <a:srgbClr val="000000"/>
+                </a:solidFill>
+                <a:latin typeface="Arial"/>
+                <a:ea typeface="DejaVu Sans"/>
               </a:rPr>
               <a:t>GET http://localhost:2020/cds-services </a:t>
             </a:r>
@@ -15794,7 +16278,11 @@
             </a:pPr>
             <a:r>
               <a:rPr b="0" lang="en-US" sz="1800" spc="-1" strike="noStrike">
-                <a:latin typeface="Arial"/>
+                <a:solidFill>
+                  <a:srgbClr val="000000"/>
+                </a:solidFill>
+                <a:latin typeface="Arial"/>
+                <a:ea typeface="DejaVu Sans"/>
               </a:rPr>
               <a:t>RESPONSE CONTINUED (order-select service):</a:t>
             </a:r>
@@ -15812,13 +16300,13 @@
         </p:nvPicPr>
         <p:blipFill>
           <a:blip r:embed="rId1"/>
-          <a:srcRect l="26270" t="33204" r="2974" b="3895"/>
+          <a:srcRect l="26274" t="33207" r="2974" b="3895"/>
           <a:stretch/>
         </p:blipFill>
         <p:spPr>
           <a:xfrm>
             <a:off x="914400" y="1737360"/>
-            <a:ext cx="7131600" cy="3565440"/>
+            <a:ext cx="7131240" cy="3565080"/>
           </a:xfrm>
           <a:prstGeom prst="rect">
             <a:avLst/>
@@ -15867,7 +16355,7 @@
         <p:spPr>
           <a:xfrm>
             <a:off x="504000" y="234000"/>
-            <a:ext cx="9070920" cy="305640"/>
+            <a:ext cx="9070560" cy="305280"/>
           </a:xfrm>
           <a:prstGeom prst="rect">
             <a:avLst/>
@@ -15895,7 +16383,11 @@
             </a:pPr>
             <a:r>
               <a:rPr b="0" lang="en-US" sz="2000" spc="-1" strike="noStrike">
-                <a:latin typeface="Arial"/>
+                <a:solidFill>
+                  <a:srgbClr val="000000"/>
+                </a:solidFill>
+                <a:latin typeface="Arial"/>
+                <a:ea typeface="DejaVu Sans"/>
               </a:rPr>
               <a:t>How Configuration Looks in CDS Hooks Continued</a:t>
             </a:r>
@@ -15914,7 +16406,7 @@
         <p:spPr>
           <a:xfrm>
             <a:off x="422640" y="731520"/>
-            <a:ext cx="6949800" cy="912600"/>
+            <a:ext cx="6949440" cy="912600"/>
           </a:xfrm>
           <a:prstGeom prst="rect">
             <a:avLst/>
@@ -15942,7 +16434,11 @@
             </a:pPr>
             <a:r>
               <a:rPr b="0" lang="en-US" sz="1800" spc="-1" strike="noStrike">
-                <a:latin typeface="Arial"/>
+                <a:solidFill>
+                  <a:srgbClr val="000000"/>
+                </a:solidFill>
+                <a:latin typeface="Arial"/>
+                <a:ea typeface="DejaVu Sans"/>
               </a:rPr>
               <a:t>POST http://localhost:2020/cds-services/warfarin-nsaids-cds-select</a:t>
             </a:r>
@@ -15968,7 +16464,11 @@
             </a:pPr>
             <a:r>
               <a:rPr b="0" lang="en-US" sz="1800" spc="-1" strike="noStrike">
-                <a:latin typeface="Arial"/>
+                <a:solidFill>
+                  <a:srgbClr val="000000"/>
+                </a:solidFill>
+                <a:latin typeface="Arial"/>
+                <a:ea typeface="DejaVu Sans"/>
               </a:rPr>
               <a:t>REQUEST (Warfarin-NSAIDS order-select service):</a:t>
             </a:r>
@@ -15986,13 +16486,13 @@
         </p:nvPicPr>
         <p:blipFill>
           <a:blip r:embed="rId1"/>
-          <a:srcRect l="24455" t="40406" r="18392" b="4752"/>
+          <a:srcRect l="24459" t="40413" r="18394" b="4752"/>
           <a:stretch/>
         </p:blipFill>
         <p:spPr>
           <a:xfrm>
             <a:off x="640440" y="1700640"/>
-            <a:ext cx="7223040" cy="3897720"/>
+            <a:ext cx="7222680" cy="3897360"/>
           </a:xfrm>
           <a:prstGeom prst="rect">
             <a:avLst/>
@@ -16041,7 +16541,7 @@
         <p:spPr>
           <a:xfrm>
             <a:off x="504000" y="234000"/>
-            <a:ext cx="9070920" cy="305640"/>
+            <a:ext cx="9070560" cy="305280"/>
           </a:xfrm>
           <a:prstGeom prst="rect">
             <a:avLst/>
@@ -16069,7 +16569,11 @@
             </a:pPr>
             <a:r>
               <a:rPr b="0" lang="en-US" sz="2000" spc="-1" strike="noStrike">
-                <a:latin typeface="Arial"/>
+                <a:solidFill>
+                  <a:srgbClr val="000000"/>
+                </a:solidFill>
+                <a:latin typeface="Arial"/>
+                <a:ea typeface="DejaVu Sans"/>
               </a:rPr>
               <a:t>How Configuration Looks in CDS Hooks Continued</a:t>
             </a:r>
@@ -16088,7 +16592,7 @@
         <p:spPr>
           <a:xfrm>
             <a:off x="422640" y="731520"/>
-            <a:ext cx="6771600" cy="912600"/>
+            <a:ext cx="6771240" cy="912600"/>
           </a:xfrm>
           <a:prstGeom prst="rect">
             <a:avLst/>
@@ -16116,7 +16620,11 @@
             </a:pPr>
             <a:r>
               <a:rPr b="0" lang="en-US" sz="1800" spc="-1" strike="noStrike">
-                <a:latin typeface="Arial"/>
+                <a:solidFill>
+                  <a:srgbClr val="000000"/>
+                </a:solidFill>
+                <a:latin typeface="Arial"/>
+                <a:ea typeface="DejaVu Sans"/>
               </a:rPr>
               <a:t>POST http://localhost:2020/cds-services/warfarin-nsaids-cds-sign</a:t>
             </a:r>
@@ -16142,7 +16650,11 @@
             </a:pPr>
             <a:r>
               <a:rPr b="0" lang="en-US" sz="1800" spc="-1" strike="noStrike">
-                <a:latin typeface="Arial"/>
+                <a:solidFill>
+                  <a:srgbClr val="000000"/>
+                </a:solidFill>
+                <a:latin typeface="Arial"/>
+                <a:ea typeface="DejaVu Sans"/>
               </a:rPr>
               <a:t>REQUEST (Warfarin-NSAIDS order-sign service):</a:t>
             </a:r>
@@ -16160,13 +16672,13 @@
         </p:nvPicPr>
         <p:blipFill>
           <a:blip r:embed="rId1"/>
-          <a:srcRect l="24455" t="40952" r="29276" b="5820"/>
+          <a:srcRect l="24459" t="40959" r="29280" b="5820"/>
           <a:stretch/>
         </p:blipFill>
         <p:spPr>
           <a:xfrm>
             <a:off x="1097280" y="1589760"/>
-            <a:ext cx="6217560" cy="4023000"/>
+            <a:ext cx="6217200" cy="4022640"/>
           </a:xfrm>
           <a:prstGeom prst="rect">
             <a:avLst/>
@@ -16303,18 +16815,21 @@
             </a:schemeClr>
           </a:solidFill>
           <a:prstDash val="solid"/>
+          <a:miter/>
         </a:ln>
         <a:ln w="25400" cap="flat" cmpd="sng" algn="ctr">
           <a:solidFill>
             <a:schemeClr val="phClr"/>
           </a:solidFill>
           <a:prstDash val="solid"/>
+          <a:miter/>
         </a:ln>
         <a:ln w="38100" cap="flat" cmpd="sng" algn="ctr">
           <a:solidFill>
             <a:schemeClr val="phClr"/>
           </a:solidFill>
           <a:prstDash val="solid"/>
+          <a:miter/>
         </a:ln>
       </a:lnStyleLst>
       <a:effectStyleLst>
@@ -16526,18 +17041,21 @@
             </a:schemeClr>
           </a:solidFill>
           <a:prstDash val="solid"/>
+          <a:miter/>
         </a:ln>
         <a:ln w="25400" cap="flat" cmpd="sng" algn="ctr">
           <a:solidFill>
             <a:schemeClr val="phClr"/>
           </a:solidFill>
           <a:prstDash val="solid"/>
+          <a:miter/>
         </a:ln>
         <a:ln w="38100" cap="flat" cmpd="sng" algn="ctr">
           <a:solidFill>
             <a:schemeClr val="phClr"/>
           </a:solidFill>
           <a:prstDash val="solid"/>
+          <a:miter/>
         </a:ln>
       </a:lnStyleLst>
       <a:effectStyleLst>
@@ -16749,18 +17267,21 @@
             </a:schemeClr>
           </a:solidFill>
           <a:prstDash val="solid"/>
+          <a:miter/>
         </a:ln>
         <a:ln w="25400" cap="flat" cmpd="sng" algn="ctr">
           <a:solidFill>
             <a:schemeClr val="phClr"/>
           </a:solidFill>
           <a:prstDash val="solid"/>
+          <a:miter/>
         </a:ln>
         <a:ln w="38100" cap="flat" cmpd="sng" algn="ctr">
           <a:solidFill>
             <a:schemeClr val="phClr"/>
           </a:solidFill>
           <a:prstDash val="solid"/>
+          <a:miter/>
         </a:ln>
       </a:lnStyleLst>
       <a:effectStyleLst>
@@ -16972,18 +17493,21 @@
             </a:schemeClr>
           </a:solidFill>
           <a:prstDash val="solid"/>
+          <a:miter/>
         </a:ln>
         <a:ln w="25400" cap="flat" cmpd="sng" algn="ctr">
           <a:solidFill>
             <a:schemeClr val="phClr"/>
           </a:solidFill>
           <a:prstDash val="solid"/>
+          <a:miter/>
         </a:ln>
         <a:ln w="38100" cap="flat" cmpd="sng" algn="ctr">
           <a:solidFill>
             <a:schemeClr val="phClr"/>
           </a:solidFill>
           <a:prstDash val="solid"/>
+          <a:miter/>
         </a:ln>
       </a:lnStyleLst>
       <a:effectStyleLst>
@@ -17195,18 +17719,21 @@
             </a:schemeClr>
           </a:solidFill>
           <a:prstDash val="solid"/>
+          <a:miter/>
         </a:ln>
         <a:ln w="25400" cap="flat" cmpd="sng" algn="ctr">
           <a:solidFill>
             <a:schemeClr val="phClr"/>
           </a:solidFill>
           <a:prstDash val="solid"/>
+          <a:miter/>
         </a:ln>
         <a:ln w="38100" cap="flat" cmpd="sng" algn="ctr">
           <a:solidFill>
             <a:schemeClr val="phClr"/>
           </a:solidFill>
           <a:prstDash val="solid"/>
+          <a:miter/>
         </a:ln>
       </a:lnStyleLst>
       <a:effectStyleLst>
@@ -17418,18 +17945,21 @@
             </a:schemeClr>
           </a:solidFill>
           <a:prstDash val="solid"/>
+          <a:miter/>
         </a:ln>
         <a:ln w="25400" cap="flat" cmpd="sng" algn="ctr">
           <a:solidFill>
             <a:schemeClr val="phClr"/>
           </a:solidFill>
           <a:prstDash val="solid"/>
+          <a:miter/>
         </a:ln>
         <a:ln w="38100" cap="flat" cmpd="sng" algn="ctr">
           <a:solidFill>
             <a:schemeClr val="phClr"/>
           </a:solidFill>
           <a:prstDash val="solid"/>
+          <a:miter/>
         </a:ln>
       </a:lnStyleLst>
       <a:effectStyleLst>
@@ -17641,18 +18171,21 @@
             </a:schemeClr>
           </a:solidFill>
           <a:prstDash val="solid"/>
+          <a:miter/>
         </a:ln>
         <a:ln w="25400" cap="flat" cmpd="sng" algn="ctr">
           <a:solidFill>
             <a:schemeClr val="phClr"/>
           </a:solidFill>
           <a:prstDash val="solid"/>
+          <a:miter/>
         </a:ln>
         <a:ln w="38100" cap="flat" cmpd="sng" algn="ctr">
           <a:solidFill>
             <a:schemeClr val="phClr"/>
           </a:solidFill>
           <a:prstDash val="solid"/>
+          <a:miter/>
         </a:ln>
       </a:lnStyleLst>
       <a:effectStyleLst>

</xml_diff>

<commit_message>
changes to address issues raised from the prior ballot
</commit_message>
<xml_diff>
--- a/Documents/Presentations/Feb-2020-update-to-DDI-CDS-wg.pptx
+++ b/Documents/Presentations/Feb-2020-update-to-DDI-CDS-wg.pptx
@@ -10316,8 +10316,8 @@
         </p:nvSpPr>
         <p:spPr>
           <a:xfrm>
-            <a:off x="504000" y="225720"/>
-            <a:ext cx="9071640" cy="946800"/>
+            <a:off x="504000" y="226080"/>
+            <a:ext cx="9071640" cy="946080"/>
           </a:xfrm>
           <a:prstGeom prst="rect">
             <a:avLst/>
@@ -10926,8 +10926,8 @@
         </p:nvSpPr>
         <p:spPr>
           <a:xfrm>
-            <a:off x="504000" y="225720"/>
-            <a:ext cx="9071640" cy="946800"/>
+            <a:off x="504000" y="226080"/>
+            <a:ext cx="9071640" cy="946080"/>
           </a:xfrm>
           <a:prstGeom prst="rect">
             <a:avLst/>
@@ -11357,8 +11357,8 @@
         </p:nvSpPr>
         <p:spPr>
           <a:xfrm>
-            <a:off x="504000" y="225720"/>
-            <a:ext cx="9071640" cy="946800"/>
+            <a:off x="504000" y="226080"/>
+            <a:ext cx="9071640" cy="946080"/>
           </a:xfrm>
           <a:prstGeom prst="rect">
             <a:avLst/>
@@ -12396,7 +12396,7 @@
         <p:spPr>
           <a:xfrm>
             <a:off x="504000" y="363600"/>
-            <a:ext cx="9070560" cy="670320"/>
+            <a:ext cx="9070200" cy="669960"/>
           </a:xfrm>
           <a:prstGeom prst="rect">
             <a:avLst/>
@@ -12447,7 +12447,7 @@
         <p:spPr>
           <a:xfrm>
             <a:off x="504000" y="2482560"/>
-            <a:ext cx="9070560" cy="974880"/>
+            <a:ext cx="9070200" cy="974520"/>
           </a:xfrm>
           <a:prstGeom prst="rect">
             <a:avLst/>
@@ -12548,7 +12548,7 @@
         <p:spPr>
           <a:xfrm>
             <a:off x="504000" y="363240"/>
-            <a:ext cx="9070560" cy="670680"/>
+            <a:ext cx="9070200" cy="670320"/>
           </a:xfrm>
           <a:prstGeom prst="rect">
             <a:avLst/>
@@ -12599,7 +12599,7 @@
         <p:spPr>
           <a:xfrm>
             <a:off x="1718640" y="1737360"/>
-            <a:ext cx="6102360" cy="2558520"/>
+            <a:ext cx="6102000" cy="2558520"/>
           </a:xfrm>
           <a:prstGeom prst="rect">
             <a:avLst/>
@@ -12790,7 +12790,7 @@
         <p:spPr>
           <a:xfrm>
             <a:off x="529920" y="242280"/>
-            <a:ext cx="9070560" cy="396360"/>
+            <a:ext cx="9070200" cy="396000"/>
           </a:xfrm>
           <a:prstGeom prst="rect">
             <a:avLst/>
@@ -12841,7 +12841,7 @@
         <p:spPr>
           <a:xfrm>
             <a:off x="360360" y="953280"/>
-            <a:ext cx="9662400" cy="3930120"/>
+            <a:ext cx="9662040" cy="3930120"/>
           </a:xfrm>
           <a:prstGeom prst="rect">
             <a:avLst/>
@@ -13132,7 +13132,7 @@
         <p:spPr>
           <a:xfrm>
             <a:off x="529920" y="242280"/>
-            <a:ext cx="9070560" cy="396360"/>
+            <a:ext cx="9070200" cy="396000"/>
           </a:xfrm>
           <a:prstGeom prst="rect">
             <a:avLst/>
@@ -13183,7 +13183,7 @@
         <p:spPr>
           <a:xfrm>
             <a:off x="268920" y="752760"/>
-            <a:ext cx="8860680" cy="5027400"/>
+            <a:ext cx="8860320" cy="5301720"/>
           </a:xfrm>
           <a:prstGeom prst="rect">
             <a:avLst/>
@@ -13614,7 +13614,7 @@
         <p:spPr>
           <a:xfrm>
             <a:off x="504000" y="363240"/>
-            <a:ext cx="9070560" cy="670680"/>
+            <a:ext cx="9070200" cy="670320"/>
           </a:xfrm>
           <a:prstGeom prst="rect">
             <a:avLst/>
@@ -13665,7 +13665,7 @@
         <p:spPr>
           <a:xfrm>
             <a:off x="2743200" y="1097280"/>
-            <a:ext cx="4694040" cy="363960"/>
+            <a:ext cx="4693680" cy="638280"/>
           </a:xfrm>
           <a:prstGeom prst="rect">
             <a:avLst/>
@@ -13716,7 +13716,7 @@
         <p:spPr>
           <a:xfrm>
             <a:off x="274320" y="1611000"/>
-            <a:ext cx="9424800" cy="3930120"/>
+            <a:ext cx="9424440" cy="3930120"/>
           </a:xfrm>
           <a:prstGeom prst="rect">
             <a:avLst/>
@@ -13744,7 +13744,11 @@
             </a:pPr>
             <a:r>
               <a:rPr b="0" lang="en-US" sz="1800" spc="-1" strike="noStrike">
-                <a:latin typeface="Arial"/>
+                <a:solidFill>
+                  <a:srgbClr val="000000"/>
+                </a:solidFill>
+                <a:latin typeface="Arial"/>
+                <a:ea typeface="DejaVu Sans"/>
               </a:rPr>
               <a:t>- We agreed that the mechanism for configuration and coordination is what we will</a:t>
             </a:r>
@@ -13760,7 +13764,11 @@
             </a:pPr>
             <a:r>
               <a:rPr b="0" lang="en-US" sz="1800" spc="-1" strike="noStrike">
-                <a:latin typeface="Arial"/>
+                <a:solidFill>
+                  <a:srgbClr val="000000"/>
+                </a:solidFill>
+                <a:latin typeface="Arial"/>
+                <a:ea typeface="DejaVu Sans"/>
               </a:rPr>
               <a:t>Ballot. Similar to CDS Hooks where the Hooks were examples to begin with, and the </a:t>
             </a:r>
@@ -13776,7 +13784,11 @@
             </a:pPr>
             <a:r>
               <a:rPr b="0" lang="en-US" sz="1800" spc="-1" strike="noStrike">
-                <a:latin typeface="Arial"/>
+                <a:solidFill>
+                  <a:srgbClr val="000000"/>
+                </a:solidFill>
+                <a:latin typeface="Arial"/>
+                <a:ea typeface="DejaVu Sans"/>
               </a:rPr>
               <a:t>later balloted separately – we would like to ballot the IG with example configuration </a:t>
             </a:r>
@@ -13792,7 +13804,11 @@
             </a:pPr>
             <a:r>
               <a:rPr b="0" lang="en-US" sz="1800" spc="-1" strike="noStrike">
-                <a:latin typeface="Arial"/>
+                <a:solidFill>
+                  <a:srgbClr val="000000"/>
+                </a:solidFill>
+                <a:latin typeface="Arial"/>
+                <a:ea typeface="DejaVu Sans"/>
               </a:rPr>
               <a:t>options (except for the two that enable coordination between order-select and order-sign)</a:t>
             </a:r>
@@ -13808,7 +13824,11 @@
             </a:pPr>
             <a:r>
               <a:rPr b="0" lang="en-US" sz="1800" spc="-1" strike="noStrike">
-                <a:latin typeface="Arial"/>
+                <a:solidFill>
+                  <a:srgbClr val="000000"/>
+                </a:solidFill>
+                <a:latin typeface="Arial"/>
+                <a:ea typeface="DejaVu Sans"/>
               </a:rPr>
               <a:t>and then ballot for standard configuration options separately. </a:t>
             </a:r>
@@ -13834,7 +13854,11 @@
             </a:pPr>
             <a:r>
               <a:rPr b="0" lang="en-US" sz="1800" spc="-1" strike="noStrike">
-                <a:latin typeface="Arial"/>
+                <a:solidFill>
+                  <a:srgbClr val="000000"/>
+                </a:solidFill>
+                <a:latin typeface="Arial"/>
+                <a:ea typeface="DejaVu Sans"/>
               </a:rPr>
               <a:t>- We agreed that further discussion with the broader CDS WG is necessary but that the </a:t>
             </a:r>
@@ -13850,7 +13874,11 @@
             </a:pPr>
             <a:r>
               <a:rPr b="0" lang="en-US" sz="1800" spc="-1" strike="noStrike">
-                <a:latin typeface="Arial"/>
+                <a:solidFill>
+                  <a:srgbClr val="000000"/>
+                </a:solidFill>
+                <a:latin typeface="Arial"/>
+                <a:ea typeface="DejaVu Sans"/>
               </a:rPr>
               <a:t>mechanism looks promising. </a:t>
             </a:r>
@@ -13876,7 +13904,11 @@
             </a:pPr>
             <a:r>
               <a:rPr b="0" lang="en-US" sz="1800" spc="-1" strike="noStrike">
-                <a:latin typeface="Arial"/>
+                <a:solidFill>
+                  <a:srgbClr val="000000"/>
+                </a:solidFill>
+                <a:latin typeface="Arial"/>
+                <a:ea typeface="DejaVu Sans"/>
               </a:rPr>
               <a:t>- Clarification needed on 1) why a URI to a PDDI knowledge artifact is needed to coordinate</a:t>
             </a:r>
@@ -13892,7 +13924,11 @@
             </a:pPr>
             <a:r>
               <a:rPr b="0" lang="en-US" sz="1800" spc="-1" strike="noStrike">
-                <a:latin typeface="Arial"/>
+                <a:solidFill>
+                  <a:srgbClr val="000000"/>
+                </a:solidFill>
+                <a:latin typeface="Arial"/>
+                <a:ea typeface="DejaVu Sans"/>
               </a:rPr>
               <a:t>Filtering, 2) will returning an information card mentioning filtering be normative, 3) the final</a:t>
             </a:r>
@@ -13908,7 +13944,11 @@
             </a:pPr>
             <a:r>
               <a:rPr b="0" lang="en-US" sz="1800" spc="-1" strike="noStrike">
-                <a:latin typeface="Arial"/>
+                <a:solidFill>
+                  <a:srgbClr val="000000"/>
+                </a:solidFill>
+                <a:latin typeface="Arial"/>
+                <a:ea typeface="DejaVu Sans"/>
               </a:rPr>
               <a:t>normative list of things necessary for filtering to work, 4) should we extend configuration </a:t>
             </a:r>
@@ -13924,7 +13964,11 @@
             </a:pPr>
             <a:r>
               <a:rPr b="0" lang="en-US" sz="1800" spc="-1" strike="noStrike">
-                <a:latin typeface="Arial"/>
+                <a:solidFill>
+                  <a:srgbClr val="000000"/>
+                </a:solidFill>
+                <a:latin typeface="Arial"/>
+                <a:ea typeface="DejaVu Sans"/>
               </a:rPr>
               <a:t>so it indicates optional vs required configs</a:t>
             </a:r>
@@ -13983,7 +14027,7 @@
         <p:spPr>
           <a:xfrm>
             <a:off x="504000" y="363240"/>
-            <a:ext cx="9070560" cy="670680"/>
+            <a:ext cx="9070200" cy="670320"/>
           </a:xfrm>
           <a:prstGeom prst="rect">
             <a:avLst/>
@@ -14034,7 +14078,7 @@
         <p:spPr>
           <a:xfrm>
             <a:off x="310320" y="1098360"/>
-            <a:ext cx="9424800" cy="3656520"/>
+            <a:ext cx="9424440" cy="3656160"/>
           </a:xfrm>
           <a:prstGeom prst="rect">
             <a:avLst/>
@@ -14062,7 +14106,11 @@
             </a:pPr>
             <a:r>
               <a:rPr b="0" lang="en-US" sz="1800" spc="-1" strike="noStrike">
-                <a:latin typeface="Arial"/>
+                <a:solidFill>
+                  <a:srgbClr val="000000"/>
+                </a:solidFill>
+                <a:latin typeface="Arial"/>
+                <a:ea typeface="DejaVu Sans"/>
               </a:rPr>
               <a:t>- We agreed that the mechanism for configuration and coordination is what we will</a:t>
             </a:r>
@@ -14078,19 +14126,31 @@
             </a:pPr>
             <a:r>
               <a:rPr b="0" lang="en-US" sz="1800" spc="-1" strike="noStrike">
-                <a:latin typeface="Arial"/>
+                <a:solidFill>
+                  <a:srgbClr val="000000"/>
+                </a:solidFill>
+                <a:latin typeface="Arial"/>
+                <a:ea typeface="DejaVu Sans"/>
               </a:rPr>
               <a:t>ballot with example configuration options and the </a:t>
             </a:r>
             <a:r>
               <a:rPr b="1" lang="en-US" sz="1800" spc="-1" strike="noStrike">
-                <a:latin typeface="Arial"/>
+                <a:solidFill>
+                  <a:srgbClr val="000000"/>
+                </a:solidFill>
+                <a:latin typeface="Arial"/>
+                <a:ea typeface="DejaVu Sans"/>
               </a:rPr>
               <a:t>two </a:t>
             </a:r>
             <a:r>
               <a:rPr b="0" lang="en-US" sz="1800" spc="-1" strike="noStrike">
-                <a:latin typeface="Arial"/>
+                <a:solidFill>
+                  <a:srgbClr val="000000"/>
+                </a:solidFill>
+                <a:latin typeface="Arial"/>
+                <a:ea typeface="DejaVu Sans"/>
               </a:rPr>
               <a:t>required options that enable coordination between order-select and order-sign</a:t>
             </a:r>
@@ -14106,7 +14166,11 @@
             </a:pPr>
             <a:r>
               <a:rPr b="0" lang="en-US" sz="1800" spc="-1" strike="noStrike">
-                <a:latin typeface="Arial"/>
+                <a:solidFill>
+                  <a:srgbClr val="000000"/>
+                </a:solidFill>
+                <a:latin typeface="Arial"/>
+                <a:ea typeface="DejaVu Sans"/>
               </a:rPr>
               <a:t>- We agree to cache the URI of the plan definition at order select as the reference to knowledge artifact</a:t>
             </a:r>
@@ -14122,7 +14186,11 @@
             </a:pPr>
             <a:r>
               <a:rPr b="0" lang="en-US" sz="1800" spc="-1" strike="noStrike">
-                <a:latin typeface="Arial"/>
+                <a:solidFill>
+                  <a:srgbClr val="000000"/>
+                </a:solidFill>
+                <a:latin typeface="Arial"/>
+                <a:ea typeface="DejaVu Sans"/>
               </a:rPr>
               <a:t>- We agreed to add the order select “selected drug” ID to cache and use that at order sign so that filtering is based on the following: URI of knowledge artifact + encounter id + patient id + practitioner id + selected medication</a:t>
             </a:r>
@@ -14138,7 +14206,11 @@
             </a:pPr>
             <a:r>
               <a:rPr b="0" lang="en-US" sz="1800" spc="-1" strike="noStrike">
-                <a:latin typeface="Arial"/>
+                <a:solidFill>
+                  <a:srgbClr val="000000"/>
+                </a:solidFill>
+                <a:latin typeface="Arial"/>
+                <a:ea typeface="DejaVu Sans"/>
               </a:rPr>
               <a:t>- We agreed that the IG will provide clarification in the form of state and activity diagrams on how the server needs to coordinate filtering</a:t>
             </a:r>
@@ -14154,7 +14226,11 @@
             </a:pPr>
             <a:r>
               <a:rPr b="0" lang="en-US" sz="1800" spc="-1" strike="noStrike">
-                <a:latin typeface="Arial"/>
+                <a:solidFill>
+                  <a:srgbClr val="000000"/>
+                </a:solidFill>
+                <a:latin typeface="Arial"/>
+                <a:ea typeface="DejaVu Sans"/>
               </a:rPr>
               <a:t>- We agreed that we will SUGGEST returning an information card mentioning </a:t>
             </a:r>
@@ -14170,7 +14246,11 @@
             </a:pPr>
             <a:r>
               <a:rPr b="0" lang="en-US" sz="1800" spc="-1" strike="noStrike">
-                <a:latin typeface="Arial"/>
+                <a:solidFill>
+                  <a:srgbClr val="000000"/>
+                </a:solidFill>
+                <a:latin typeface="Arial"/>
+                <a:ea typeface="DejaVu Sans"/>
               </a:rPr>
               <a:t>- We will NOT extend configuration so it indicates optional vs required configs</a:t>
             </a:r>
@@ -14229,7 +14309,7 @@
         <p:spPr>
           <a:xfrm>
             <a:off x="504000" y="226080"/>
-            <a:ext cx="9070560" cy="945360"/>
+            <a:ext cx="9070200" cy="945000"/>
           </a:xfrm>
           <a:prstGeom prst="rect">
             <a:avLst/>
@@ -14255,7 +14335,7 @@
         <p:spPr>
           <a:xfrm>
             <a:off x="504000" y="1326600"/>
-            <a:ext cx="4425840" cy="3287160"/>
+            <a:ext cx="4425480" cy="3286800"/>
           </a:xfrm>
           <a:prstGeom prst="rect">
             <a:avLst/>
@@ -14281,7 +14361,7 @@
         <p:spPr>
           <a:xfrm>
             <a:off x="5152680" y="1326600"/>
-            <a:ext cx="4425840" cy="1567080"/>
+            <a:ext cx="4425480" cy="1566720"/>
           </a:xfrm>
           <a:prstGeom prst="rect">
             <a:avLst/>
@@ -14307,7 +14387,7 @@
         <p:spPr>
           <a:xfrm>
             <a:off x="5152680" y="3044160"/>
-            <a:ext cx="4425840" cy="1567080"/>
+            <a:ext cx="4425480" cy="1566720"/>
           </a:xfrm>
           <a:prstGeom prst="rect">
             <a:avLst/>
@@ -14363,7 +14443,7 @@
         <p:spPr>
           <a:xfrm>
             <a:off x="504000" y="226080"/>
-            <a:ext cx="9070560" cy="945360"/>
+            <a:ext cx="9070200" cy="945000"/>
           </a:xfrm>
           <a:prstGeom prst="rect">
             <a:avLst/>
@@ -14389,7 +14469,7 @@
         <p:spPr>
           <a:xfrm>
             <a:off x="504000" y="1326600"/>
-            <a:ext cx="4425840" cy="1567080"/>
+            <a:ext cx="4425480" cy="1566720"/>
           </a:xfrm>
           <a:prstGeom prst="rect">
             <a:avLst/>
@@ -14415,7 +14495,7 @@
         <p:spPr>
           <a:xfrm>
             <a:off x="5152680" y="1326600"/>
-            <a:ext cx="4425840" cy="1567080"/>
+            <a:ext cx="4425480" cy="1566720"/>
           </a:xfrm>
           <a:prstGeom prst="rect">
             <a:avLst/>
@@ -14441,7 +14521,7 @@
         <p:spPr>
           <a:xfrm>
             <a:off x="504000" y="3044160"/>
-            <a:ext cx="9070560" cy="1567080"/>
+            <a:ext cx="9070200" cy="1566720"/>
           </a:xfrm>
           <a:prstGeom prst="rect">
             <a:avLst/>
@@ -14497,7 +14577,7 @@
         <p:spPr>
           <a:xfrm>
             <a:off x="504000" y="226080"/>
-            <a:ext cx="9070560" cy="945360"/>
+            <a:ext cx="9070200" cy="945000"/>
           </a:xfrm>
           <a:prstGeom prst="rect">
             <a:avLst/>
@@ -14523,7 +14603,7 @@
         <p:spPr>
           <a:xfrm>
             <a:off x="504000" y="1326600"/>
-            <a:ext cx="9070560" cy="1567080"/>
+            <a:ext cx="9070200" cy="1566720"/>
           </a:xfrm>
           <a:prstGeom prst="rect">
             <a:avLst/>
@@ -14549,7 +14629,7 @@
         <p:spPr>
           <a:xfrm>
             <a:off x="504000" y="3044160"/>
-            <a:ext cx="9070560" cy="1567080"/>
+            <a:ext cx="9070200" cy="1566720"/>
           </a:xfrm>
           <a:prstGeom prst="rect">
             <a:avLst/>
@@ -14605,7 +14685,7 @@
         <p:spPr>
           <a:xfrm>
             <a:off x="504000" y="226080"/>
-            <a:ext cx="9070560" cy="945360"/>
+            <a:ext cx="9070200" cy="945000"/>
           </a:xfrm>
           <a:prstGeom prst="rect">
             <a:avLst/>
@@ -14631,7 +14711,7 @@
         <p:spPr>
           <a:xfrm>
             <a:off x="504000" y="1326600"/>
-            <a:ext cx="4425840" cy="1567080"/>
+            <a:ext cx="4425480" cy="1566720"/>
           </a:xfrm>
           <a:prstGeom prst="rect">
             <a:avLst/>
@@ -14657,7 +14737,7 @@
         <p:spPr>
           <a:xfrm>
             <a:off x="5152680" y="1326600"/>
-            <a:ext cx="4425840" cy="1567080"/>
+            <a:ext cx="4425480" cy="1566720"/>
           </a:xfrm>
           <a:prstGeom prst="rect">
             <a:avLst/>
@@ -14683,7 +14763,7 @@
         <p:spPr>
           <a:xfrm>
             <a:off x="504000" y="3044160"/>
-            <a:ext cx="4425840" cy="1567080"/>
+            <a:ext cx="4425480" cy="1566720"/>
           </a:xfrm>
           <a:prstGeom prst="rect">
             <a:avLst/>
@@ -14709,7 +14789,7 @@
         <p:spPr>
           <a:xfrm>
             <a:off x="5152680" y="3044160"/>
-            <a:ext cx="4425840" cy="1567080"/>
+            <a:ext cx="4425480" cy="1566720"/>
           </a:xfrm>
           <a:prstGeom prst="rect">
             <a:avLst/>
@@ -14765,7 +14845,7 @@
         <p:spPr>
           <a:xfrm>
             <a:off x="504000" y="226080"/>
-            <a:ext cx="9070560" cy="945360"/>
+            <a:ext cx="9070200" cy="945000"/>
           </a:xfrm>
           <a:prstGeom prst="rect">
             <a:avLst/>
@@ -14791,7 +14871,7 @@
         <p:spPr>
           <a:xfrm>
             <a:off x="504000" y="1326600"/>
-            <a:ext cx="2919600" cy="1567080"/>
+            <a:ext cx="2919240" cy="1566720"/>
           </a:xfrm>
           <a:prstGeom prst="rect">
             <a:avLst/>
@@ -14817,7 +14897,7 @@
         <p:spPr>
           <a:xfrm>
             <a:off x="3571200" y="1326600"/>
-            <a:ext cx="2919600" cy="1567080"/>
+            <a:ext cx="2919240" cy="1566720"/>
           </a:xfrm>
           <a:prstGeom prst="rect">
             <a:avLst/>
@@ -14843,7 +14923,7 @@
         <p:spPr>
           <a:xfrm>
             <a:off x="6638040" y="1326600"/>
-            <a:ext cx="2919600" cy="1567080"/>
+            <a:ext cx="2919240" cy="1566720"/>
           </a:xfrm>
           <a:prstGeom prst="rect">
             <a:avLst/>
@@ -14869,7 +14949,7 @@
         <p:spPr>
           <a:xfrm>
             <a:off x="504000" y="3044160"/>
-            <a:ext cx="2919600" cy="1567080"/>
+            <a:ext cx="2919240" cy="1566720"/>
           </a:xfrm>
           <a:prstGeom prst="rect">
             <a:avLst/>
@@ -14895,7 +14975,7 @@
         <p:spPr>
           <a:xfrm>
             <a:off x="3571200" y="3044160"/>
-            <a:ext cx="2919600" cy="1567080"/>
+            <a:ext cx="2919240" cy="1566720"/>
           </a:xfrm>
           <a:prstGeom prst="rect">
             <a:avLst/>
@@ -14921,7 +15001,7 @@
         <p:spPr>
           <a:xfrm>
             <a:off x="6638040" y="3044160"/>
-            <a:ext cx="2919600" cy="1567080"/>
+            <a:ext cx="2919240" cy="1566720"/>
           </a:xfrm>
           <a:prstGeom prst="rect">
             <a:avLst/>
@@ -14977,7 +15057,7 @@
         <p:spPr>
           <a:xfrm>
             <a:off x="504000" y="363600"/>
-            <a:ext cx="9070560" cy="670320"/>
+            <a:ext cx="9070200" cy="669960"/>
           </a:xfrm>
           <a:prstGeom prst="rect">
             <a:avLst/>
@@ -15028,7 +15108,7 @@
         <p:spPr>
           <a:xfrm>
             <a:off x="504000" y="1326600"/>
-            <a:ext cx="9070560" cy="3287160"/>
+            <a:ext cx="9070200" cy="3286800"/>
           </a:xfrm>
           <a:prstGeom prst="rect">
             <a:avLst/>
@@ -15049,7 +15129,7 @@
             <a:normAutofit/>
           </a:bodyPr>
           <a:p>
-            <a:pPr marL="432000" indent="-322920">
+            <a:pPr marL="432000" indent="-322560">
               <a:lnSpc>
                 <a:spcPct val="100000"/>
               </a:lnSpc>
@@ -15072,7 +15152,7 @@
             </a:endParaRPr>
           </a:p>
           <a:p>
-            <a:pPr lvl="1" marL="864000" indent="-322920">
+            <a:pPr lvl="1" marL="864000" indent="-322560">
               <a:lnSpc>
                 <a:spcPct val="100000"/>
               </a:lnSpc>
@@ -15101,7 +15181,7 @@
             </a:endParaRPr>
           </a:p>
           <a:p>
-            <a:pPr lvl="2" marL="1296000" indent="-286920">
+            <a:pPr lvl="2" marL="1296000" indent="-286560">
               <a:lnSpc>
                 <a:spcPct val="100000"/>
               </a:lnSpc>
@@ -15130,7 +15210,7 @@
             </a:endParaRPr>
           </a:p>
           <a:p>
-            <a:pPr lvl="1" marL="864000" indent="-322920">
+            <a:pPr lvl="1" marL="864000" indent="-322560">
               <a:lnSpc>
                 <a:spcPct val="100000"/>
               </a:lnSpc>
@@ -15159,7 +15239,7 @@
             </a:endParaRPr>
           </a:p>
           <a:p>
-            <a:pPr lvl="2" marL="1296000" indent="-286920">
+            <a:pPr lvl="2" marL="1296000" indent="-286560">
               <a:lnSpc>
                 <a:spcPct val="100000"/>
               </a:lnSpc>
@@ -15228,7 +15308,7 @@
         <p:spPr>
           <a:xfrm>
             <a:off x="504000" y="363600"/>
-            <a:ext cx="9070560" cy="670320"/>
+            <a:ext cx="9070200" cy="669960"/>
           </a:xfrm>
           <a:prstGeom prst="rect">
             <a:avLst/>
@@ -15279,7 +15359,7 @@
         <p:spPr>
           <a:xfrm>
             <a:off x="504000" y="1326600"/>
-            <a:ext cx="9070560" cy="3287160"/>
+            <a:ext cx="9070200" cy="3286800"/>
           </a:xfrm>
           <a:prstGeom prst="rect">
             <a:avLst/>
@@ -15300,7 +15380,7 @@
             <a:normAutofit/>
           </a:bodyPr>
           <a:p>
-            <a:pPr marL="432000" indent="-322920">
+            <a:pPr marL="432000" indent="-322560">
               <a:lnSpc>
                 <a:spcPct val="100000"/>
               </a:lnSpc>
@@ -15323,7 +15403,7 @@
             </a:endParaRPr>
           </a:p>
           <a:p>
-            <a:pPr lvl="1" marL="864000" indent="-322920">
+            <a:pPr lvl="1" marL="864000" indent="-322560">
               <a:lnSpc>
                 <a:spcPct val="100000"/>
               </a:lnSpc>
@@ -15352,7 +15432,7 @@
             </a:endParaRPr>
           </a:p>
           <a:p>
-            <a:pPr lvl="2" marL="1296000" indent="-286920">
+            <a:pPr lvl="2" marL="1296000" indent="-286560">
               <a:lnSpc>
                 <a:spcPct val="100000"/>
               </a:lnSpc>
@@ -15381,7 +15461,7 @@
             </a:endParaRPr>
           </a:p>
           <a:p>
-            <a:pPr lvl="1" marL="864000" indent="-322920">
+            <a:pPr lvl="1" marL="864000" indent="-322560">
               <a:lnSpc>
                 <a:spcPct val="100000"/>
               </a:lnSpc>
@@ -15450,7 +15530,7 @@
         <p:spPr>
           <a:xfrm>
             <a:off x="504000" y="363600"/>
-            <a:ext cx="9070560" cy="670320"/>
+            <a:ext cx="9070200" cy="669960"/>
           </a:xfrm>
           <a:prstGeom prst="rect">
             <a:avLst/>
@@ -15501,7 +15581,7 @@
         <p:spPr>
           <a:xfrm>
             <a:off x="504000" y="1326600"/>
-            <a:ext cx="9070560" cy="3287160"/>
+            <a:ext cx="9070200" cy="3286800"/>
           </a:xfrm>
           <a:prstGeom prst="rect">
             <a:avLst/>
@@ -15522,7 +15602,7 @@
             <a:normAutofit fontScale="35000"/>
           </a:bodyPr>
           <a:p>
-            <a:pPr marL="432000" indent="-322920">
+            <a:pPr marL="432000" indent="-322560">
               <a:lnSpc>
                 <a:spcPct val="100000"/>
               </a:lnSpc>
@@ -15555,7 +15635,7 @@
             </a:endParaRPr>
           </a:p>
           <a:p>
-            <a:pPr lvl="1" marL="864000" indent="-322920">
+            <a:pPr lvl="1" marL="864000" indent="-322560">
               <a:lnSpc>
                 <a:spcPct val="100000"/>
               </a:lnSpc>
@@ -15584,7 +15664,7 @@
             </a:endParaRPr>
           </a:p>
           <a:p>
-            <a:pPr lvl="1" marL="864000" indent="-322920">
+            <a:pPr lvl="1" marL="864000" indent="-322560">
               <a:lnSpc>
                 <a:spcPct val="100000"/>
               </a:lnSpc>
@@ -15613,7 +15693,7 @@
             </a:endParaRPr>
           </a:p>
           <a:p>
-            <a:pPr lvl="1" marL="864000" indent="-322920">
+            <a:pPr lvl="1" marL="864000" indent="-322560">
               <a:lnSpc>
                 <a:spcPct val="100000"/>
               </a:lnSpc>
@@ -15642,7 +15722,7 @@
             </a:endParaRPr>
           </a:p>
           <a:p>
-            <a:pPr lvl="1" marL="864000" indent="-322920">
+            <a:pPr lvl="1" marL="864000" indent="-322560">
               <a:lnSpc>
                 <a:spcPct val="100000"/>
               </a:lnSpc>
@@ -15671,7 +15751,7 @@
             </a:endParaRPr>
           </a:p>
           <a:p>
-            <a:pPr lvl="1" marL="864000" indent="-322920">
+            <a:pPr lvl="1" marL="864000" indent="-322560">
               <a:lnSpc>
                 <a:spcPct val="100000"/>
               </a:lnSpc>
@@ -15740,7 +15820,7 @@
         <p:spPr>
           <a:xfrm>
             <a:off x="504000" y="211680"/>
-            <a:ext cx="9070560" cy="974160"/>
+            <a:ext cx="9070200" cy="974160"/>
           </a:xfrm>
           <a:prstGeom prst="rect">
             <a:avLst/>
@@ -15791,7 +15871,7 @@
         <p:spPr>
           <a:xfrm>
             <a:off x="731520" y="1811880"/>
-            <a:ext cx="8502840" cy="1186920"/>
+            <a:ext cx="8502480" cy="1186920"/>
           </a:xfrm>
           <a:prstGeom prst="rect">
             <a:avLst/>
@@ -15872,7 +15952,7 @@
         <p:spPr>
           <a:xfrm>
             <a:off x="731520" y="3468240"/>
-            <a:ext cx="8502840" cy="1186920"/>
+            <a:ext cx="8502480" cy="1186920"/>
           </a:xfrm>
           <a:prstGeom prst="rect">
             <a:avLst/>
@@ -15983,7 +16063,7 @@
         <p:spPr>
           <a:xfrm>
             <a:off x="504000" y="234000"/>
-            <a:ext cx="9070560" cy="305280"/>
+            <a:ext cx="9070200" cy="304920"/>
           </a:xfrm>
           <a:prstGeom prst="rect">
             <a:avLst/>
@@ -16033,13 +16113,13 @@
         </p:nvPicPr>
         <p:blipFill>
           <a:blip r:embed="rId1"/>
-          <a:srcRect l="25364" t="33207" r="2067" b="3895"/>
+          <a:srcRect l="25368" t="33211" r="2067" b="3895"/>
           <a:stretch/>
         </p:blipFill>
         <p:spPr>
           <a:xfrm>
             <a:off x="274320" y="1645920"/>
-            <a:ext cx="7314120" cy="3565080"/>
+            <a:ext cx="7313760" cy="3564720"/>
           </a:xfrm>
           <a:prstGeom prst="rect">
             <a:avLst/>
@@ -16058,7 +16138,7 @@
         <p:spPr>
           <a:xfrm>
             <a:off x="422640" y="731520"/>
-            <a:ext cx="4148640" cy="912600"/>
+            <a:ext cx="4148280" cy="912600"/>
           </a:xfrm>
           <a:prstGeom prst="rect">
             <a:avLst/>
@@ -16169,7 +16249,7 @@
         <p:spPr>
           <a:xfrm>
             <a:off x="504000" y="234000"/>
-            <a:ext cx="9070560" cy="305280"/>
+            <a:ext cx="9070200" cy="304920"/>
           </a:xfrm>
           <a:prstGeom prst="rect">
             <a:avLst/>
@@ -16220,7 +16300,7 @@
         <p:spPr>
           <a:xfrm>
             <a:off x="422640" y="731520"/>
-            <a:ext cx="5142240" cy="912600"/>
+            <a:ext cx="5141880" cy="1186920"/>
           </a:xfrm>
           <a:prstGeom prst="rect">
             <a:avLst/>
@@ -16300,13 +16380,13 @@
         </p:nvPicPr>
         <p:blipFill>
           <a:blip r:embed="rId1"/>
-          <a:srcRect l="26274" t="33207" r="2974" b="3895"/>
+          <a:srcRect l="26278" t="33211" r="2974" b="3895"/>
           <a:stretch/>
         </p:blipFill>
         <p:spPr>
           <a:xfrm>
             <a:off x="914400" y="1737360"/>
-            <a:ext cx="7131240" cy="3565080"/>
+            <a:ext cx="7130880" cy="3564720"/>
           </a:xfrm>
           <a:prstGeom prst="rect">
             <a:avLst/>
@@ -16355,7 +16435,7 @@
         <p:spPr>
           <a:xfrm>
             <a:off x="504000" y="234000"/>
-            <a:ext cx="9070560" cy="305280"/>
+            <a:ext cx="9070200" cy="304920"/>
           </a:xfrm>
           <a:prstGeom prst="rect">
             <a:avLst/>
@@ -16406,7 +16486,7 @@
         <p:spPr>
           <a:xfrm>
             <a:off x="422640" y="731520"/>
-            <a:ext cx="6949440" cy="912600"/>
+            <a:ext cx="6949080" cy="912600"/>
           </a:xfrm>
           <a:prstGeom prst="rect">
             <a:avLst/>
@@ -16486,13 +16566,13 @@
         </p:nvPicPr>
         <p:blipFill>
           <a:blip r:embed="rId1"/>
-          <a:srcRect l="24459" t="40413" r="18394" b="4752"/>
+          <a:srcRect l="24463" t="40420" r="18396" b="4752"/>
           <a:stretch/>
         </p:blipFill>
         <p:spPr>
           <a:xfrm>
             <a:off x="640440" y="1700640"/>
-            <a:ext cx="7222680" cy="3897360"/>
+            <a:ext cx="7222320" cy="3897000"/>
           </a:xfrm>
           <a:prstGeom prst="rect">
             <a:avLst/>
@@ -16541,7 +16621,7 @@
         <p:spPr>
           <a:xfrm>
             <a:off x="504000" y="234000"/>
-            <a:ext cx="9070560" cy="305280"/>
+            <a:ext cx="9070200" cy="304920"/>
           </a:xfrm>
           <a:prstGeom prst="rect">
             <a:avLst/>
@@ -16592,7 +16672,7 @@
         <p:spPr>
           <a:xfrm>
             <a:off x="422640" y="731520"/>
-            <a:ext cx="6771240" cy="912600"/>
+            <a:ext cx="6770880" cy="912600"/>
           </a:xfrm>
           <a:prstGeom prst="rect">
             <a:avLst/>
@@ -16672,13 +16752,13 @@
         </p:nvPicPr>
         <p:blipFill>
           <a:blip r:embed="rId1"/>
-          <a:srcRect l="24459" t="40959" r="29280" b="5820"/>
+          <a:srcRect l="24463" t="40966" r="29283" b="5820"/>
           <a:stretch/>
         </p:blipFill>
         <p:spPr>
           <a:xfrm>
             <a:off x="1097280" y="1589760"/>
-            <a:ext cx="6217200" cy="4022640"/>
+            <a:ext cx="6216840" cy="4022280"/>
           </a:xfrm>
           <a:prstGeom prst="rect">
             <a:avLst/>

</xml_diff>